<commit_message>
adding explanatory text on resolverBehaviour slide
</commit_message>
<xml_diff>
--- a/docs/IdentifierCharts.pptx
+++ b/docs/IdentifierCharts.pptx
@@ -105,6 +105,11 @@
       </a:defRPr>
     </a:lvl9pPr>
   </p:defaultTextStyle>
+  <p:extLst>
+    <p:ext uri="{EFAFB233-063F-42B5-8137-9DF3F51BA10A}">
+      <p15:sldGuideLst xmlns:p15="http://schemas.microsoft.com/office/powerpoint/2012/main"/>
+    </p:ext>
+  </p:extLst>
 </p:presentation>
 </file>
 
@@ -4807,7 +4812,7 @@
         <p:spPr>
           <a:xfrm>
             <a:off x="426812" y="4841276"/>
-            <a:ext cx="7877285" cy="2031325"/>
+            <a:ext cx="8969635" cy="2031325"/>
           </a:xfrm>
           <a:prstGeom prst="rect">
             <a:avLst/>
@@ -4828,16 +4833,29 @@
           <a:p>
             <a:r>
               <a:rPr lang="en-US" dirty="0" smtClean="0"/>
-              <a:t>If {</a:t>
+              <a:t>If </a:t>
+            </a:r>
+            <a:r>
+              <a:rPr lang="en-US" dirty="0" smtClean="0"/>
+              <a:t>(</a:t>
             </a:r>
             <a:r>
               <a:rPr lang="en-US" dirty="0" err="1" smtClean="0"/>
-              <a:t>webaddress</a:t>
+              <a:t>bcid.webaddress</a:t>
             </a:r>
             <a:r>
               <a:rPr lang="en-US" dirty="0" smtClean="0"/>
-              <a:t> is defined in database return that}</a:t>
-            </a:r>
+              <a:t> != null) return </a:t>
+            </a:r>
+            <a:r>
+              <a:rPr lang="en-US" dirty="0" err="1" smtClean="0"/>
+              <a:t>bcid.webaddress</a:t>
+            </a:r>
+            <a:r>
+              <a:rPr lang="en-US" dirty="0" smtClean="0"/>
+              <a:t>;   // From database</a:t>
+            </a:r>
+            <a:endParaRPr lang="en-US" dirty="0" smtClean="0"/>
           </a:p>
           <a:p>
             <a:r>
@@ -4848,7 +4866,19 @@
           <a:p>
             <a:r>
               <a:rPr lang="en-US" dirty="0" smtClean="0"/>
-              <a:t>     If {(ID Type = Expedition) return </a:t>
+              <a:t>     If </a:t>
+            </a:r>
+            <a:r>
+              <a:rPr lang="en-US" dirty="0" smtClean="0"/>
+              <a:t>(</a:t>
+            </a:r>
+            <a:r>
+              <a:rPr lang="en-US" dirty="0" smtClean="0"/>
+              <a:t>ID Type = Expedition) return </a:t>
+            </a:r>
+            <a:r>
+              <a:rPr lang="en-US" dirty="0" smtClean="0"/>
+              <a:t>&lt;</a:t>
             </a:r>
             <a:r>
               <a:rPr lang="en-US" dirty="0" err="1" smtClean="0"/>
@@ -4856,8 +4886,9 @@
             </a:r>
             <a:r>
               <a:rPr lang="en-US" dirty="0" smtClean="0"/>
-              <a:t>;</a:t>
-            </a:r>
+              <a:t>&gt;{ark};</a:t>
+            </a:r>
+            <a:endParaRPr lang="en-US" dirty="0" smtClean="0"/>
           </a:p>
           <a:p>
             <a:r>
@@ -4874,8 +4905,9 @@
             </a:r>
             <a:r>
               <a:rPr lang="en-US" dirty="0" smtClean="0"/>
-              <a:t>;</a:t>
-            </a:r>
+              <a:t>/{ark}/{suffix};</a:t>
+            </a:r>
+            <a:endParaRPr lang="en-US" dirty="0" smtClean="0"/>
           </a:p>
           <a:p>
             <a:r>
@@ -4884,8 +4916,17 @@
             </a:r>
             <a:r>
               <a:rPr lang="en-US" dirty="0" smtClean="0"/>
-              <a:t>    else return “Display Metadata Address”</a:t>
-            </a:r>
+              <a:t>    else return “Display Metadata </a:t>
+            </a:r>
+            <a:r>
+              <a:rPr lang="en-US" smtClean="0"/>
+              <a:t>Address</a:t>
+            </a:r>
+            <a:r>
+              <a:rPr lang="en-US" smtClean="0"/>
+              <a:t>”                    </a:t>
+            </a:r>
+            <a:endParaRPr lang="en-US" dirty="0" smtClean="0"/>
           </a:p>
           <a:p>
             <a:r>
@@ -4893,6 +4934,85 @@
               <a:t>}</a:t>
             </a:r>
             <a:endParaRPr lang="en-US" dirty="0" smtClean="0"/>
+          </a:p>
+        </p:txBody>
+      </p:sp>
+      <p:sp>
+        <p:nvSpPr>
+          <p:cNvPr id="2" name="TextBox 1"/>
+          <p:cNvSpPr txBox="1"/>
+          <p:nvPr/>
+        </p:nvSpPr>
+        <p:spPr>
+          <a:xfrm>
+            <a:off x="9684310" y="5657850"/>
+            <a:ext cx="1395318" cy="646331"/>
+          </a:xfrm>
+          <a:prstGeom prst="rect">
+            <a:avLst/>
+          </a:prstGeom>
+          <a:noFill/>
+        </p:spPr>
+        <p:txBody>
+          <a:bodyPr wrap="none" rtlCol="0">
+            <a:spAutoFit/>
+          </a:bodyPr>
+          <a:lstStyle/>
+          <a:p>
+            <a:r>
+              <a:rPr lang="en-US" i="1" dirty="0" smtClean="0"/>
+              <a:t>Uses apache</a:t>
+            </a:r>
+          </a:p>
+          <a:p>
+            <a:r>
+              <a:rPr lang="en-US" i="1" dirty="0" err="1" smtClean="0"/>
+              <a:t>strSubstituor</a:t>
+            </a:r>
+            <a:endParaRPr lang="en-US" i="1" dirty="0"/>
+          </a:p>
+        </p:txBody>
+      </p:sp>
+      <p:sp>
+        <p:nvSpPr>
+          <p:cNvPr id="3" name="Right Brace 2"/>
+          <p:cNvSpPr/>
+          <p:nvPr/>
+        </p:nvSpPr>
+        <p:spPr>
+          <a:xfrm>
+            <a:off x="9502209" y="5738129"/>
+            <a:ext cx="130702" cy="566052"/>
+          </a:xfrm>
+          <a:prstGeom prst="rightBrace">
+            <a:avLst/>
+          </a:prstGeom>
+          <a:ln>
+            <a:solidFill>
+              <a:schemeClr val="tx1"/>
+            </a:solidFill>
+          </a:ln>
+        </p:spPr>
+        <p:style>
+          <a:lnRef idx="1">
+            <a:schemeClr val="accent1"/>
+          </a:lnRef>
+          <a:fillRef idx="0">
+            <a:schemeClr val="accent1"/>
+          </a:fillRef>
+          <a:effectRef idx="0">
+            <a:schemeClr val="accent1"/>
+          </a:effectRef>
+          <a:fontRef idx="minor">
+            <a:schemeClr val="tx1"/>
+          </a:fontRef>
+        </p:style>
+        <p:txBody>
+          <a:bodyPr rtlCol="0" anchor="ctr"/>
+          <a:lstStyle/>
+          <a:p>
+            <a:pPr algn="ctr"/>
+            <a:endParaRPr lang="en-US"/>
           </a:p>
         </p:txBody>
       </p:sp>

</xml_diff>

<commit_message>
some edits to BCID examples
</commit_message>
<xml_diff>
--- a/docs/IdentifierCharts.pptx
+++ b/docs/IdentifierCharts.pptx
@@ -2,13 +2,13 @@
 <file path=ppt/presentation.xml><?xml version="1.0" encoding="utf-8"?>
 <p:presentation xmlns:a="http://schemas.openxmlformats.org/drawingml/2006/main" xmlns:r="http://schemas.openxmlformats.org/officeDocument/2006/relationships" xmlns:p="http://schemas.openxmlformats.org/presentationml/2006/main" saveSubsetFonts="1" autoCompressPictures="0">
   <p:sldMasterIdLst>
-    <p:sldMasterId id="2147483648" r:id="rId1"/>
+    <p:sldMasterId id="2147483660" r:id="rId1"/>
   </p:sldMasterIdLst>
   <p:sldIdLst>
     <p:sldId id="256" r:id="rId2"/>
     <p:sldId id="257" r:id="rId3"/>
   </p:sldIdLst>
-  <p:sldSz cx="12192000" cy="6858000"/>
+  <p:sldSz cx="12192000" cy="8229600"/>
   <p:notesSz cx="6858000" cy="9144000"/>
   <p:defaultTextStyle>
     <a:defPPr>
@@ -142,15 +142,15 @@
         </p:nvSpPr>
         <p:spPr>
           <a:xfrm>
-            <a:off x="1524000" y="1122363"/>
-            <a:ext cx="9144000" cy="2387600"/>
+            <a:off x="914400" y="1346836"/>
+            <a:ext cx="10363200" cy="2865120"/>
           </a:xfrm>
         </p:spPr>
         <p:txBody>
           <a:bodyPr anchor="b"/>
           <a:lstStyle>
             <a:lvl1pPr algn="ctr">
-              <a:defRPr sz="6000"/>
+              <a:defRPr sz="7200"/>
             </a:lvl1pPr>
           </a:lstStyle>
           <a:p>
@@ -158,7 +158,7 @@
               <a:rPr lang="en-US" smtClean="0"/>
               <a:t>Click to edit Master title style</a:t>
             </a:r>
-            <a:endParaRPr lang="en-US"/>
+            <a:endParaRPr lang="en-US" dirty="0"/>
           </a:p>
         </p:txBody>
       </p:sp>
@@ -174,8 +174,8 @@
         </p:nvSpPr>
         <p:spPr>
           <a:xfrm>
-            <a:off x="1524000" y="3602038"/>
-            <a:ext cx="9144000" cy="1655762"/>
+            <a:off x="1524000" y="4322446"/>
+            <a:ext cx="9144000" cy="1986914"/>
           </a:xfrm>
         </p:spPr>
         <p:txBody>
@@ -183,39 +183,39 @@
           <a:lstStyle>
             <a:lvl1pPr marL="0" indent="0" algn="ctr">
               <a:buNone/>
+              <a:defRPr sz="2880"/>
+            </a:lvl1pPr>
+            <a:lvl2pPr marL="548640" indent="0" algn="ctr">
+              <a:buNone/>
               <a:defRPr sz="2400"/>
-            </a:lvl1pPr>
-            <a:lvl2pPr marL="457200" indent="0" algn="ctr">
-              <a:buNone/>
-              <a:defRPr sz="2000"/>
             </a:lvl2pPr>
-            <a:lvl3pPr marL="914400" indent="0" algn="ctr">
-              <a:buNone/>
-              <a:defRPr sz="1800"/>
+            <a:lvl3pPr marL="1097280" indent="0" algn="ctr">
+              <a:buNone/>
+              <a:defRPr sz="2160"/>
             </a:lvl3pPr>
-            <a:lvl4pPr marL="1371600" indent="0" algn="ctr">
-              <a:buNone/>
-              <a:defRPr sz="1600"/>
+            <a:lvl4pPr marL="1645920" indent="0" algn="ctr">
+              <a:buNone/>
+              <a:defRPr sz="1920"/>
             </a:lvl4pPr>
-            <a:lvl5pPr marL="1828800" indent="0" algn="ctr">
-              <a:buNone/>
-              <a:defRPr sz="1600"/>
+            <a:lvl5pPr marL="2194560" indent="0" algn="ctr">
+              <a:buNone/>
+              <a:defRPr sz="1920"/>
             </a:lvl5pPr>
-            <a:lvl6pPr marL="2286000" indent="0" algn="ctr">
-              <a:buNone/>
-              <a:defRPr sz="1600"/>
+            <a:lvl6pPr marL="2743200" indent="0" algn="ctr">
+              <a:buNone/>
+              <a:defRPr sz="1920"/>
             </a:lvl6pPr>
-            <a:lvl7pPr marL="2743200" indent="0" algn="ctr">
-              <a:buNone/>
-              <a:defRPr sz="1600"/>
+            <a:lvl7pPr marL="3291840" indent="0" algn="ctr">
+              <a:buNone/>
+              <a:defRPr sz="1920"/>
             </a:lvl7pPr>
-            <a:lvl8pPr marL="3200400" indent="0" algn="ctr">
-              <a:buNone/>
-              <a:defRPr sz="1600"/>
+            <a:lvl8pPr marL="3840480" indent="0" algn="ctr">
+              <a:buNone/>
+              <a:defRPr sz="1920"/>
             </a:lvl8pPr>
-            <a:lvl9pPr marL="3657600" indent="0" algn="ctr">
-              <a:buNone/>
-              <a:defRPr sz="1600"/>
+            <a:lvl9pPr marL="4389120" indent="0" algn="ctr">
+              <a:buNone/>
+              <a:defRPr sz="1920"/>
             </a:lvl9pPr>
           </a:lstStyle>
           <a:p>
@@ -223,7 +223,7 @@
               <a:rPr lang="en-US" smtClean="0"/>
               <a:t>Click to edit Master subtitle style</a:t>
             </a:r>
-            <a:endParaRPr lang="en-US"/>
+            <a:endParaRPr lang="en-US" dirty="0"/>
           </a:p>
         </p:txBody>
       </p:sp>
@@ -244,7 +244,7 @@
           <a:p>
             <a:fld id="{00F05B30-6747-364E-9DA1-A00B89AA3B88}" type="datetimeFigureOut">
               <a:rPr lang="en-US" smtClean="0"/>
-              <a:t>4/29/16</a:t>
+              <a:t>4/30/16</a:t>
             </a:fld>
             <a:endParaRPr lang="en-US"/>
           </a:p>
@@ -295,7 +295,7 @@
     </p:spTree>
     <p:extLst>
       <p:ext uri="{BB962C8B-B14F-4D97-AF65-F5344CB8AC3E}">
-        <p14:creationId xmlns:p14="http://schemas.microsoft.com/office/powerpoint/2010/main" val="692983158"/>
+        <p14:creationId xmlns:p14="http://schemas.microsoft.com/office/powerpoint/2010/main" val="1966267128"/>
       </p:ext>
     </p:extLst>
   </p:cSld>
@@ -341,7 +341,7 @@
               <a:rPr lang="en-US" smtClean="0"/>
               <a:t>Click to edit Master title style</a:t>
             </a:r>
-            <a:endParaRPr lang="en-US"/>
+            <a:endParaRPr lang="en-US" dirty="0"/>
           </a:p>
         </p:txBody>
       </p:sp>
@@ -393,7 +393,7 @@
               <a:rPr lang="en-US" smtClean="0"/>
               <a:t>Fifth level</a:t>
             </a:r>
-            <a:endParaRPr lang="en-US"/>
+            <a:endParaRPr lang="en-US" dirty="0"/>
           </a:p>
         </p:txBody>
       </p:sp>
@@ -414,7 +414,7 @@
           <a:p>
             <a:fld id="{00F05B30-6747-364E-9DA1-A00B89AA3B88}" type="datetimeFigureOut">
               <a:rPr lang="en-US" smtClean="0"/>
-              <a:t>4/29/16</a:t>
+              <a:t>4/30/16</a:t>
             </a:fld>
             <a:endParaRPr lang="en-US"/>
           </a:p>
@@ -465,7 +465,7 @@
     </p:spTree>
     <p:extLst>
       <p:ext uri="{BB962C8B-B14F-4D97-AF65-F5344CB8AC3E}">
-        <p14:creationId xmlns:p14="http://schemas.microsoft.com/office/powerpoint/2010/main" val="1515826479"/>
+        <p14:creationId xmlns:p14="http://schemas.microsoft.com/office/powerpoint/2010/main" val="2072488920"/>
       </p:ext>
     </p:extLst>
   </p:cSld>
@@ -504,8 +504,8 @@
         </p:nvSpPr>
         <p:spPr>
           <a:xfrm>
-            <a:off x="8724900" y="365125"/>
-            <a:ext cx="2628900" cy="5811838"/>
+            <a:off x="8724901" y="438150"/>
+            <a:ext cx="2628900" cy="6974206"/>
           </a:xfrm>
         </p:spPr>
         <p:txBody>
@@ -516,7 +516,7 @@
               <a:rPr lang="en-US" smtClean="0"/>
               <a:t>Click to edit Master title style</a:t>
             </a:r>
-            <a:endParaRPr lang="en-US"/>
+            <a:endParaRPr lang="en-US" dirty="0"/>
           </a:p>
         </p:txBody>
       </p:sp>
@@ -532,8 +532,8 @@
         </p:nvSpPr>
         <p:spPr>
           <a:xfrm>
-            <a:off x="838200" y="365125"/>
-            <a:ext cx="7734300" cy="5811838"/>
+            <a:off x="838201" y="438150"/>
+            <a:ext cx="7734300" cy="6974206"/>
           </a:xfrm>
         </p:spPr>
         <p:txBody>
@@ -573,7 +573,7 @@
               <a:rPr lang="en-US" smtClean="0"/>
               <a:t>Fifth level</a:t>
             </a:r>
-            <a:endParaRPr lang="en-US"/>
+            <a:endParaRPr lang="en-US" dirty="0"/>
           </a:p>
         </p:txBody>
       </p:sp>
@@ -594,7 +594,7 @@
           <a:p>
             <a:fld id="{00F05B30-6747-364E-9DA1-A00B89AA3B88}" type="datetimeFigureOut">
               <a:rPr lang="en-US" smtClean="0"/>
-              <a:t>4/29/16</a:t>
+              <a:t>4/30/16</a:t>
             </a:fld>
             <a:endParaRPr lang="en-US"/>
           </a:p>
@@ -645,7 +645,7 @@
     </p:spTree>
     <p:extLst>
       <p:ext uri="{BB962C8B-B14F-4D97-AF65-F5344CB8AC3E}">
-        <p14:creationId xmlns:p14="http://schemas.microsoft.com/office/powerpoint/2010/main" val="897128192"/>
+        <p14:creationId xmlns:p14="http://schemas.microsoft.com/office/powerpoint/2010/main" val="136524100"/>
       </p:ext>
     </p:extLst>
   </p:cSld>
@@ -691,7 +691,7 @@
               <a:rPr lang="en-US" smtClean="0"/>
               <a:t>Click to edit Master title style</a:t>
             </a:r>
-            <a:endParaRPr lang="en-US"/>
+            <a:endParaRPr lang="en-US" dirty="0"/>
           </a:p>
         </p:txBody>
       </p:sp>
@@ -743,7 +743,7 @@
               <a:rPr lang="en-US" smtClean="0"/>
               <a:t>Fifth level</a:t>
             </a:r>
-            <a:endParaRPr lang="en-US"/>
+            <a:endParaRPr lang="en-US" dirty="0"/>
           </a:p>
         </p:txBody>
       </p:sp>
@@ -764,7 +764,7 @@
           <a:p>
             <a:fld id="{00F05B30-6747-364E-9DA1-A00B89AA3B88}" type="datetimeFigureOut">
               <a:rPr lang="en-US" smtClean="0"/>
-              <a:t>4/29/16</a:t>
+              <a:t>4/30/16</a:t>
             </a:fld>
             <a:endParaRPr lang="en-US"/>
           </a:p>
@@ -815,7 +815,7 @@
     </p:spTree>
     <p:extLst>
       <p:ext uri="{BB962C8B-B14F-4D97-AF65-F5344CB8AC3E}">
-        <p14:creationId xmlns:p14="http://schemas.microsoft.com/office/powerpoint/2010/main" val="2081187563"/>
+        <p14:creationId xmlns:p14="http://schemas.microsoft.com/office/powerpoint/2010/main" val="1573260260"/>
       </p:ext>
     </p:extLst>
   </p:cSld>
@@ -854,15 +854,15 @@
         </p:nvSpPr>
         <p:spPr>
           <a:xfrm>
-            <a:off x="831850" y="1709738"/>
-            <a:ext cx="10515600" cy="2852737"/>
+            <a:off x="831851" y="2051688"/>
+            <a:ext cx="10515600" cy="3423284"/>
           </a:xfrm>
         </p:spPr>
         <p:txBody>
           <a:bodyPr anchor="b"/>
           <a:lstStyle>
             <a:lvl1pPr>
-              <a:defRPr sz="6000"/>
+              <a:defRPr sz="7200"/>
             </a:lvl1pPr>
           </a:lstStyle>
           <a:p>
@@ -870,7 +870,7 @@
               <a:rPr lang="en-US" smtClean="0"/>
               <a:t>Click to edit Master title style</a:t>
             </a:r>
-            <a:endParaRPr lang="en-US"/>
+            <a:endParaRPr lang="en-US" dirty="0"/>
           </a:p>
         </p:txBody>
       </p:sp>
@@ -886,14 +886,22 @@
         </p:nvSpPr>
         <p:spPr>
           <a:xfrm>
-            <a:off x="831850" y="4589463"/>
-            <a:ext cx="10515600" cy="1500187"/>
+            <a:off x="831851" y="5507358"/>
+            <a:ext cx="10515600" cy="1800224"/>
           </a:xfrm>
         </p:spPr>
         <p:txBody>
           <a:bodyPr/>
           <a:lstStyle>
             <a:lvl1pPr marL="0" indent="0">
+              <a:buNone/>
+              <a:defRPr sz="2880">
+                <a:solidFill>
+                  <a:schemeClr val="tx1"/>
+                </a:solidFill>
+              </a:defRPr>
+            </a:lvl1pPr>
+            <a:lvl2pPr marL="548640" indent="0">
               <a:buNone/>
               <a:defRPr sz="2400">
                 <a:solidFill>
@@ -902,20 +910,10 @@
                   </a:schemeClr>
                 </a:solidFill>
               </a:defRPr>
-            </a:lvl1pPr>
-            <a:lvl2pPr marL="457200" indent="0">
-              <a:buNone/>
-              <a:defRPr sz="2000">
-                <a:solidFill>
-                  <a:schemeClr val="tx1">
-                    <a:tint val="75000"/>
-                  </a:schemeClr>
-                </a:solidFill>
-              </a:defRPr>
             </a:lvl2pPr>
-            <a:lvl3pPr marL="914400" indent="0">
-              <a:buNone/>
-              <a:defRPr sz="1800">
+            <a:lvl3pPr marL="1097280" indent="0">
+              <a:buNone/>
+              <a:defRPr sz="2160">
                 <a:solidFill>
                   <a:schemeClr val="tx1">
                     <a:tint val="75000"/>
@@ -923,9 +921,9 @@
                 </a:solidFill>
               </a:defRPr>
             </a:lvl3pPr>
-            <a:lvl4pPr marL="1371600" indent="0">
-              <a:buNone/>
-              <a:defRPr sz="1600">
+            <a:lvl4pPr marL="1645920" indent="0">
+              <a:buNone/>
+              <a:defRPr sz="1920">
                 <a:solidFill>
                   <a:schemeClr val="tx1">
                     <a:tint val="75000"/>
@@ -933,9 +931,9 @@
                 </a:solidFill>
               </a:defRPr>
             </a:lvl4pPr>
-            <a:lvl5pPr marL="1828800" indent="0">
-              <a:buNone/>
-              <a:defRPr sz="1600">
+            <a:lvl5pPr marL="2194560" indent="0">
+              <a:buNone/>
+              <a:defRPr sz="1920">
                 <a:solidFill>
                   <a:schemeClr val="tx1">
                     <a:tint val="75000"/>
@@ -943,9 +941,9 @@
                 </a:solidFill>
               </a:defRPr>
             </a:lvl5pPr>
-            <a:lvl6pPr marL="2286000" indent="0">
-              <a:buNone/>
-              <a:defRPr sz="1600">
+            <a:lvl6pPr marL="2743200" indent="0">
+              <a:buNone/>
+              <a:defRPr sz="1920">
                 <a:solidFill>
                   <a:schemeClr val="tx1">
                     <a:tint val="75000"/>
@@ -953,9 +951,9 @@
                 </a:solidFill>
               </a:defRPr>
             </a:lvl6pPr>
-            <a:lvl7pPr marL="2743200" indent="0">
-              <a:buNone/>
-              <a:defRPr sz="1600">
+            <a:lvl7pPr marL="3291840" indent="0">
+              <a:buNone/>
+              <a:defRPr sz="1920">
                 <a:solidFill>
                   <a:schemeClr val="tx1">
                     <a:tint val="75000"/>
@@ -963,9 +961,9 @@
                 </a:solidFill>
               </a:defRPr>
             </a:lvl7pPr>
-            <a:lvl8pPr marL="3200400" indent="0">
-              <a:buNone/>
-              <a:defRPr sz="1600">
+            <a:lvl8pPr marL="3840480" indent="0">
+              <a:buNone/>
+              <a:defRPr sz="1920">
                 <a:solidFill>
                   <a:schemeClr val="tx1">
                     <a:tint val="75000"/>
@@ -973,9 +971,9 @@
                 </a:solidFill>
               </a:defRPr>
             </a:lvl8pPr>
-            <a:lvl9pPr marL="3657600" indent="0">
-              <a:buNone/>
-              <a:defRPr sz="1600">
+            <a:lvl9pPr marL="4389120" indent="0">
+              <a:buNone/>
+              <a:defRPr sz="1920">
                 <a:solidFill>
                   <a:schemeClr val="tx1">
                     <a:tint val="75000"/>
@@ -1010,7 +1008,7 @@
           <a:p>
             <a:fld id="{00F05B30-6747-364E-9DA1-A00B89AA3B88}" type="datetimeFigureOut">
               <a:rPr lang="en-US" smtClean="0"/>
-              <a:t>4/29/16</a:t>
+              <a:t>4/30/16</a:t>
             </a:fld>
             <a:endParaRPr lang="en-US"/>
           </a:p>
@@ -1061,7 +1059,7 @@
     </p:spTree>
     <p:extLst>
       <p:ext uri="{BB962C8B-B14F-4D97-AF65-F5344CB8AC3E}">
-        <p14:creationId xmlns:p14="http://schemas.microsoft.com/office/powerpoint/2010/main" val="305729005"/>
+        <p14:creationId xmlns:p14="http://schemas.microsoft.com/office/powerpoint/2010/main" val="1966527956"/>
       </p:ext>
     </p:extLst>
   </p:cSld>
@@ -1107,7 +1105,7 @@
               <a:rPr lang="en-US" smtClean="0"/>
               <a:t>Click to edit Master title style</a:t>
             </a:r>
-            <a:endParaRPr lang="en-US"/>
+            <a:endParaRPr lang="en-US" dirty="0"/>
           </a:p>
         </p:txBody>
       </p:sp>
@@ -1123,8 +1121,8 @@
         </p:nvSpPr>
         <p:spPr>
           <a:xfrm>
-            <a:off x="838200" y="1825625"/>
-            <a:ext cx="5181600" cy="4351338"/>
+            <a:off x="838200" y="2190750"/>
+            <a:ext cx="5181600" cy="5221606"/>
           </a:xfrm>
         </p:spPr>
         <p:txBody>
@@ -1164,7 +1162,7 @@
               <a:rPr lang="en-US" smtClean="0"/>
               <a:t>Fifth level</a:t>
             </a:r>
-            <a:endParaRPr lang="en-US"/>
+            <a:endParaRPr lang="en-US" dirty="0"/>
           </a:p>
         </p:txBody>
       </p:sp>
@@ -1180,8 +1178,8 @@
         </p:nvSpPr>
         <p:spPr>
           <a:xfrm>
-            <a:off x="6172200" y="1825625"/>
-            <a:ext cx="5181600" cy="4351338"/>
+            <a:off x="6172200" y="2190750"/>
+            <a:ext cx="5181600" cy="5221606"/>
           </a:xfrm>
         </p:spPr>
         <p:txBody>
@@ -1221,7 +1219,7 @@
               <a:rPr lang="en-US" smtClean="0"/>
               <a:t>Fifth level</a:t>
             </a:r>
-            <a:endParaRPr lang="en-US"/>
+            <a:endParaRPr lang="en-US" dirty="0"/>
           </a:p>
         </p:txBody>
       </p:sp>
@@ -1242,7 +1240,7 @@
           <a:p>
             <a:fld id="{00F05B30-6747-364E-9DA1-A00B89AA3B88}" type="datetimeFigureOut">
               <a:rPr lang="en-US" smtClean="0"/>
-              <a:t>4/29/16</a:t>
+              <a:t>4/30/16</a:t>
             </a:fld>
             <a:endParaRPr lang="en-US"/>
           </a:p>
@@ -1293,7 +1291,7 @@
     </p:spTree>
     <p:extLst>
       <p:ext uri="{BB962C8B-B14F-4D97-AF65-F5344CB8AC3E}">
-        <p14:creationId xmlns:p14="http://schemas.microsoft.com/office/powerpoint/2010/main" val="1606503411"/>
+        <p14:creationId xmlns:p14="http://schemas.microsoft.com/office/powerpoint/2010/main" val="1662029162"/>
       </p:ext>
     </p:extLst>
   </p:cSld>
@@ -1332,8 +1330,8 @@
         </p:nvSpPr>
         <p:spPr>
           <a:xfrm>
-            <a:off x="839788" y="365125"/>
-            <a:ext cx="10515600" cy="1325563"/>
+            <a:off x="839788" y="438152"/>
+            <a:ext cx="10515600" cy="1590676"/>
           </a:xfrm>
         </p:spPr>
         <p:txBody>
@@ -1344,7 +1342,7 @@
               <a:rPr lang="en-US" smtClean="0"/>
               <a:t>Click to edit Master title style</a:t>
             </a:r>
-            <a:endParaRPr lang="en-US"/>
+            <a:endParaRPr lang="en-US" dirty="0"/>
           </a:p>
         </p:txBody>
       </p:sp>
@@ -1360,8 +1358,8 @@
         </p:nvSpPr>
         <p:spPr>
           <a:xfrm>
-            <a:off x="839788" y="1681163"/>
-            <a:ext cx="5157787" cy="823912"/>
+            <a:off x="839789" y="2017396"/>
+            <a:ext cx="5157787" cy="988694"/>
           </a:xfrm>
         </p:spPr>
         <p:txBody>
@@ -1369,39 +1367,39 @@
           <a:lstStyle>
             <a:lvl1pPr marL="0" indent="0">
               <a:buNone/>
+              <a:defRPr sz="2880" b="1"/>
+            </a:lvl1pPr>
+            <a:lvl2pPr marL="548640" indent="0">
+              <a:buNone/>
               <a:defRPr sz="2400" b="1"/>
-            </a:lvl1pPr>
-            <a:lvl2pPr marL="457200" indent="0">
-              <a:buNone/>
-              <a:defRPr sz="2000" b="1"/>
             </a:lvl2pPr>
-            <a:lvl3pPr marL="914400" indent="0">
-              <a:buNone/>
-              <a:defRPr sz="1800" b="1"/>
+            <a:lvl3pPr marL="1097280" indent="0">
+              <a:buNone/>
+              <a:defRPr sz="2160" b="1"/>
             </a:lvl3pPr>
-            <a:lvl4pPr marL="1371600" indent="0">
-              <a:buNone/>
-              <a:defRPr sz="1600" b="1"/>
+            <a:lvl4pPr marL="1645920" indent="0">
+              <a:buNone/>
+              <a:defRPr sz="1920" b="1"/>
             </a:lvl4pPr>
-            <a:lvl5pPr marL="1828800" indent="0">
-              <a:buNone/>
-              <a:defRPr sz="1600" b="1"/>
+            <a:lvl5pPr marL="2194560" indent="0">
+              <a:buNone/>
+              <a:defRPr sz="1920" b="1"/>
             </a:lvl5pPr>
-            <a:lvl6pPr marL="2286000" indent="0">
-              <a:buNone/>
-              <a:defRPr sz="1600" b="1"/>
+            <a:lvl6pPr marL="2743200" indent="0">
+              <a:buNone/>
+              <a:defRPr sz="1920" b="1"/>
             </a:lvl6pPr>
-            <a:lvl7pPr marL="2743200" indent="0">
-              <a:buNone/>
-              <a:defRPr sz="1600" b="1"/>
+            <a:lvl7pPr marL="3291840" indent="0">
+              <a:buNone/>
+              <a:defRPr sz="1920" b="1"/>
             </a:lvl7pPr>
-            <a:lvl8pPr marL="3200400" indent="0">
-              <a:buNone/>
-              <a:defRPr sz="1600" b="1"/>
+            <a:lvl8pPr marL="3840480" indent="0">
+              <a:buNone/>
+              <a:defRPr sz="1920" b="1"/>
             </a:lvl8pPr>
-            <a:lvl9pPr marL="3657600" indent="0">
-              <a:buNone/>
-              <a:defRPr sz="1600" b="1"/>
+            <a:lvl9pPr marL="4389120" indent="0">
+              <a:buNone/>
+              <a:defRPr sz="1920" b="1"/>
             </a:lvl9pPr>
           </a:lstStyle>
           <a:p>
@@ -1425,8 +1423,8 @@
         </p:nvSpPr>
         <p:spPr>
           <a:xfrm>
-            <a:off x="839788" y="2505075"/>
-            <a:ext cx="5157787" cy="3684588"/>
+            <a:off x="839789" y="3006090"/>
+            <a:ext cx="5157787" cy="4421506"/>
           </a:xfrm>
         </p:spPr>
         <p:txBody>
@@ -1466,7 +1464,7 @@
               <a:rPr lang="en-US" smtClean="0"/>
               <a:t>Fifth level</a:t>
             </a:r>
-            <a:endParaRPr lang="en-US"/>
+            <a:endParaRPr lang="en-US" dirty="0"/>
           </a:p>
         </p:txBody>
       </p:sp>
@@ -1482,8 +1480,8 @@
         </p:nvSpPr>
         <p:spPr>
           <a:xfrm>
-            <a:off x="6172200" y="1681163"/>
-            <a:ext cx="5183188" cy="823912"/>
+            <a:off x="6172201" y="2017396"/>
+            <a:ext cx="5183188" cy="988694"/>
           </a:xfrm>
         </p:spPr>
         <p:txBody>
@@ -1491,39 +1489,39 @@
           <a:lstStyle>
             <a:lvl1pPr marL="0" indent="0">
               <a:buNone/>
+              <a:defRPr sz="2880" b="1"/>
+            </a:lvl1pPr>
+            <a:lvl2pPr marL="548640" indent="0">
+              <a:buNone/>
               <a:defRPr sz="2400" b="1"/>
-            </a:lvl1pPr>
-            <a:lvl2pPr marL="457200" indent="0">
-              <a:buNone/>
-              <a:defRPr sz="2000" b="1"/>
             </a:lvl2pPr>
-            <a:lvl3pPr marL="914400" indent="0">
-              <a:buNone/>
-              <a:defRPr sz="1800" b="1"/>
+            <a:lvl3pPr marL="1097280" indent="0">
+              <a:buNone/>
+              <a:defRPr sz="2160" b="1"/>
             </a:lvl3pPr>
-            <a:lvl4pPr marL="1371600" indent="0">
-              <a:buNone/>
-              <a:defRPr sz="1600" b="1"/>
+            <a:lvl4pPr marL="1645920" indent="0">
+              <a:buNone/>
+              <a:defRPr sz="1920" b="1"/>
             </a:lvl4pPr>
-            <a:lvl5pPr marL="1828800" indent="0">
-              <a:buNone/>
-              <a:defRPr sz="1600" b="1"/>
+            <a:lvl5pPr marL="2194560" indent="0">
+              <a:buNone/>
+              <a:defRPr sz="1920" b="1"/>
             </a:lvl5pPr>
-            <a:lvl6pPr marL="2286000" indent="0">
-              <a:buNone/>
-              <a:defRPr sz="1600" b="1"/>
+            <a:lvl6pPr marL="2743200" indent="0">
+              <a:buNone/>
+              <a:defRPr sz="1920" b="1"/>
             </a:lvl6pPr>
-            <a:lvl7pPr marL="2743200" indent="0">
-              <a:buNone/>
-              <a:defRPr sz="1600" b="1"/>
+            <a:lvl7pPr marL="3291840" indent="0">
+              <a:buNone/>
+              <a:defRPr sz="1920" b="1"/>
             </a:lvl7pPr>
-            <a:lvl8pPr marL="3200400" indent="0">
-              <a:buNone/>
-              <a:defRPr sz="1600" b="1"/>
+            <a:lvl8pPr marL="3840480" indent="0">
+              <a:buNone/>
+              <a:defRPr sz="1920" b="1"/>
             </a:lvl8pPr>
-            <a:lvl9pPr marL="3657600" indent="0">
-              <a:buNone/>
-              <a:defRPr sz="1600" b="1"/>
+            <a:lvl9pPr marL="4389120" indent="0">
+              <a:buNone/>
+              <a:defRPr sz="1920" b="1"/>
             </a:lvl9pPr>
           </a:lstStyle>
           <a:p>
@@ -1547,8 +1545,8 @@
         </p:nvSpPr>
         <p:spPr>
           <a:xfrm>
-            <a:off x="6172200" y="2505075"/>
-            <a:ext cx="5183188" cy="3684588"/>
+            <a:off x="6172201" y="3006090"/>
+            <a:ext cx="5183188" cy="4421506"/>
           </a:xfrm>
         </p:spPr>
         <p:txBody>
@@ -1588,7 +1586,7 @@
               <a:rPr lang="en-US" smtClean="0"/>
               <a:t>Fifth level</a:t>
             </a:r>
-            <a:endParaRPr lang="en-US"/>
+            <a:endParaRPr lang="en-US" dirty="0"/>
           </a:p>
         </p:txBody>
       </p:sp>
@@ -1609,7 +1607,7 @@
           <a:p>
             <a:fld id="{00F05B30-6747-364E-9DA1-A00B89AA3B88}" type="datetimeFigureOut">
               <a:rPr lang="en-US" smtClean="0"/>
-              <a:t>4/29/16</a:t>
+              <a:t>4/30/16</a:t>
             </a:fld>
             <a:endParaRPr lang="en-US"/>
           </a:p>
@@ -1660,7 +1658,7 @@
     </p:spTree>
     <p:extLst>
       <p:ext uri="{BB962C8B-B14F-4D97-AF65-F5344CB8AC3E}">
-        <p14:creationId xmlns:p14="http://schemas.microsoft.com/office/powerpoint/2010/main" val="190934946"/>
+        <p14:creationId xmlns:p14="http://schemas.microsoft.com/office/powerpoint/2010/main" val="1404329205"/>
       </p:ext>
     </p:extLst>
   </p:cSld>
@@ -1706,7 +1704,7 @@
               <a:rPr lang="en-US" smtClean="0"/>
               <a:t>Click to edit Master title style</a:t>
             </a:r>
-            <a:endParaRPr lang="en-US"/>
+            <a:endParaRPr lang="en-US" dirty="0"/>
           </a:p>
         </p:txBody>
       </p:sp>
@@ -1727,7 +1725,7 @@
           <a:p>
             <a:fld id="{00F05B30-6747-364E-9DA1-A00B89AA3B88}" type="datetimeFigureOut">
               <a:rPr lang="en-US" smtClean="0"/>
-              <a:t>4/29/16</a:t>
+              <a:t>4/30/16</a:t>
             </a:fld>
             <a:endParaRPr lang="en-US"/>
           </a:p>
@@ -1778,7 +1776,7 @@
     </p:spTree>
     <p:extLst>
       <p:ext uri="{BB962C8B-B14F-4D97-AF65-F5344CB8AC3E}">
-        <p14:creationId xmlns:p14="http://schemas.microsoft.com/office/powerpoint/2010/main" val="703068804"/>
+        <p14:creationId xmlns:p14="http://schemas.microsoft.com/office/powerpoint/2010/main" val="1715667905"/>
       </p:ext>
     </p:extLst>
   </p:cSld>
@@ -1822,7 +1820,7 @@
           <a:p>
             <a:fld id="{00F05B30-6747-364E-9DA1-A00B89AA3B88}" type="datetimeFigureOut">
               <a:rPr lang="en-US" smtClean="0"/>
-              <a:t>4/29/16</a:t>
+              <a:t>4/30/16</a:t>
             </a:fld>
             <a:endParaRPr lang="en-US"/>
           </a:p>
@@ -1873,7 +1871,7 @@
     </p:spTree>
     <p:extLst>
       <p:ext uri="{BB962C8B-B14F-4D97-AF65-F5344CB8AC3E}">
-        <p14:creationId xmlns:p14="http://schemas.microsoft.com/office/powerpoint/2010/main" val="1022363034"/>
+        <p14:creationId xmlns:p14="http://schemas.microsoft.com/office/powerpoint/2010/main" val="967551066"/>
       </p:ext>
     </p:extLst>
   </p:cSld>
@@ -1912,15 +1910,15 @@
         </p:nvSpPr>
         <p:spPr>
           <a:xfrm>
-            <a:off x="839788" y="457200"/>
-            <a:ext cx="3932237" cy="1600200"/>
+            <a:off x="839788" y="548640"/>
+            <a:ext cx="3932237" cy="1920240"/>
           </a:xfrm>
         </p:spPr>
         <p:txBody>
           <a:bodyPr anchor="b"/>
           <a:lstStyle>
             <a:lvl1pPr>
-              <a:defRPr sz="3200"/>
+              <a:defRPr sz="3840"/>
             </a:lvl1pPr>
           </a:lstStyle>
           <a:p>
@@ -1928,7 +1926,7 @@
               <a:rPr lang="en-US" smtClean="0"/>
               <a:t>Click to edit Master title style</a:t>
             </a:r>
-            <a:endParaRPr lang="en-US"/>
+            <a:endParaRPr lang="en-US" dirty="0"/>
           </a:p>
         </p:txBody>
       </p:sp>
@@ -1944,39 +1942,39 @@
         </p:nvSpPr>
         <p:spPr>
           <a:xfrm>
-            <a:off x="5183188" y="987425"/>
-            <a:ext cx="6172200" cy="4873625"/>
+            <a:off x="5183188" y="1184912"/>
+            <a:ext cx="6172200" cy="5848350"/>
           </a:xfrm>
         </p:spPr>
         <p:txBody>
           <a:bodyPr/>
           <a:lstStyle>
             <a:lvl1pPr>
-              <a:defRPr sz="3200"/>
+              <a:defRPr sz="3840"/>
             </a:lvl1pPr>
             <a:lvl2pPr>
-              <a:defRPr sz="2800"/>
+              <a:defRPr sz="3360"/>
             </a:lvl2pPr>
             <a:lvl3pPr>
-              <a:defRPr sz="2400"/>
+              <a:defRPr sz="2880"/>
             </a:lvl3pPr>
             <a:lvl4pPr>
-              <a:defRPr sz="2000"/>
+              <a:defRPr sz="2400"/>
             </a:lvl4pPr>
             <a:lvl5pPr>
-              <a:defRPr sz="2000"/>
+              <a:defRPr sz="2400"/>
             </a:lvl5pPr>
             <a:lvl6pPr>
-              <a:defRPr sz="2000"/>
+              <a:defRPr sz="2400"/>
             </a:lvl6pPr>
             <a:lvl7pPr>
-              <a:defRPr sz="2000"/>
+              <a:defRPr sz="2400"/>
             </a:lvl7pPr>
             <a:lvl8pPr>
-              <a:defRPr sz="2000"/>
+              <a:defRPr sz="2400"/>
             </a:lvl8pPr>
             <a:lvl9pPr>
-              <a:defRPr sz="2000"/>
+              <a:defRPr sz="2400"/>
             </a:lvl9pPr>
           </a:lstStyle>
           <a:p>
@@ -2013,7 +2011,7 @@
               <a:rPr lang="en-US" smtClean="0"/>
               <a:t>Fifth level</a:t>
             </a:r>
-            <a:endParaRPr lang="en-US"/>
+            <a:endParaRPr lang="en-US" dirty="0"/>
           </a:p>
         </p:txBody>
       </p:sp>
@@ -2029,8 +2027,8 @@
         </p:nvSpPr>
         <p:spPr>
           <a:xfrm>
-            <a:off x="839788" y="2057400"/>
-            <a:ext cx="3932237" cy="3811588"/>
+            <a:off x="839788" y="2468880"/>
+            <a:ext cx="3932237" cy="4573906"/>
           </a:xfrm>
         </p:spPr>
         <p:txBody>
@@ -2038,39 +2036,39 @@
           <a:lstStyle>
             <a:lvl1pPr marL="0" indent="0">
               <a:buNone/>
-              <a:defRPr sz="1600"/>
+              <a:defRPr sz="1920"/>
             </a:lvl1pPr>
-            <a:lvl2pPr marL="457200" indent="0">
-              <a:buNone/>
-              <a:defRPr sz="1400"/>
+            <a:lvl2pPr marL="548640" indent="0">
+              <a:buNone/>
+              <a:defRPr sz="1680"/>
             </a:lvl2pPr>
-            <a:lvl3pPr marL="914400" indent="0">
+            <a:lvl3pPr marL="1097280" indent="0">
+              <a:buNone/>
+              <a:defRPr sz="1440"/>
+            </a:lvl3pPr>
+            <a:lvl4pPr marL="1645920" indent="0">
               <a:buNone/>
               <a:defRPr sz="1200"/>
-            </a:lvl3pPr>
-            <a:lvl4pPr marL="1371600" indent="0">
-              <a:buNone/>
-              <a:defRPr sz="1000"/>
             </a:lvl4pPr>
-            <a:lvl5pPr marL="1828800" indent="0">
-              <a:buNone/>
-              <a:defRPr sz="1000"/>
+            <a:lvl5pPr marL="2194560" indent="0">
+              <a:buNone/>
+              <a:defRPr sz="1200"/>
             </a:lvl5pPr>
-            <a:lvl6pPr marL="2286000" indent="0">
-              <a:buNone/>
-              <a:defRPr sz="1000"/>
+            <a:lvl6pPr marL="2743200" indent="0">
+              <a:buNone/>
+              <a:defRPr sz="1200"/>
             </a:lvl6pPr>
-            <a:lvl7pPr marL="2743200" indent="0">
-              <a:buNone/>
-              <a:defRPr sz="1000"/>
+            <a:lvl7pPr marL="3291840" indent="0">
+              <a:buNone/>
+              <a:defRPr sz="1200"/>
             </a:lvl7pPr>
-            <a:lvl8pPr marL="3200400" indent="0">
-              <a:buNone/>
-              <a:defRPr sz="1000"/>
+            <a:lvl8pPr marL="3840480" indent="0">
+              <a:buNone/>
+              <a:defRPr sz="1200"/>
             </a:lvl8pPr>
-            <a:lvl9pPr marL="3657600" indent="0">
-              <a:buNone/>
-              <a:defRPr sz="1000"/>
+            <a:lvl9pPr marL="4389120" indent="0">
+              <a:buNone/>
+              <a:defRPr sz="1200"/>
             </a:lvl9pPr>
           </a:lstStyle>
           <a:p>
@@ -2099,7 +2097,7 @@
           <a:p>
             <a:fld id="{00F05B30-6747-364E-9DA1-A00B89AA3B88}" type="datetimeFigureOut">
               <a:rPr lang="en-US" smtClean="0"/>
-              <a:t>4/29/16</a:t>
+              <a:t>4/30/16</a:t>
             </a:fld>
             <a:endParaRPr lang="en-US"/>
           </a:p>
@@ -2150,7 +2148,7 @@
     </p:spTree>
     <p:extLst>
       <p:ext uri="{BB962C8B-B14F-4D97-AF65-F5344CB8AC3E}">
-        <p14:creationId xmlns:p14="http://schemas.microsoft.com/office/powerpoint/2010/main" val="838852791"/>
+        <p14:creationId xmlns:p14="http://schemas.microsoft.com/office/powerpoint/2010/main" val="884591178"/>
       </p:ext>
     </p:extLst>
   </p:cSld>
@@ -2189,15 +2187,15 @@
         </p:nvSpPr>
         <p:spPr>
           <a:xfrm>
-            <a:off x="839788" y="457200"/>
-            <a:ext cx="3932237" cy="1600200"/>
+            <a:off x="839788" y="548640"/>
+            <a:ext cx="3932237" cy="1920240"/>
           </a:xfrm>
         </p:spPr>
         <p:txBody>
           <a:bodyPr anchor="b"/>
           <a:lstStyle>
             <a:lvl1pPr>
-              <a:defRPr sz="3200"/>
+              <a:defRPr sz="3840"/>
             </a:lvl1pPr>
           </a:lstStyle>
           <a:p>
@@ -2205,7 +2203,7 @@
               <a:rPr lang="en-US" smtClean="0"/>
               <a:t>Click to edit Master title style</a:t>
             </a:r>
-            <a:endParaRPr lang="en-US"/>
+            <a:endParaRPr lang="en-US" dirty="0"/>
           </a:p>
         </p:txBody>
       </p:sp>
@@ -2213,7 +2211,7 @@
         <p:nvSpPr>
           <p:cNvPr id="3" name="Picture Placeholder 2"/>
           <p:cNvSpPr>
-            <a:spLocks noGrp="1"/>
+            <a:spLocks noGrp="1" noChangeAspect="1"/>
           </p:cNvSpPr>
           <p:nvPr>
             <p:ph type="pic" idx="1"/>
@@ -2221,8 +2219,73 @@
         </p:nvSpPr>
         <p:spPr>
           <a:xfrm>
-            <a:off x="5183188" y="987425"/>
-            <a:ext cx="6172200" cy="4873625"/>
+            <a:off x="5183188" y="1184912"/>
+            <a:ext cx="6172200" cy="5848350"/>
+          </a:xfrm>
+        </p:spPr>
+        <p:txBody>
+          <a:bodyPr anchor="t"/>
+          <a:lstStyle>
+            <a:lvl1pPr marL="0" indent="0">
+              <a:buNone/>
+              <a:defRPr sz="3840"/>
+            </a:lvl1pPr>
+            <a:lvl2pPr marL="548640" indent="0">
+              <a:buNone/>
+              <a:defRPr sz="3360"/>
+            </a:lvl2pPr>
+            <a:lvl3pPr marL="1097280" indent="0">
+              <a:buNone/>
+              <a:defRPr sz="2880"/>
+            </a:lvl3pPr>
+            <a:lvl4pPr marL="1645920" indent="0">
+              <a:buNone/>
+              <a:defRPr sz="2400"/>
+            </a:lvl4pPr>
+            <a:lvl5pPr marL="2194560" indent="0">
+              <a:buNone/>
+              <a:defRPr sz="2400"/>
+            </a:lvl5pPr>
+            <a:lvl6pPr marL="2743200" indent="0">
+              <a:buNone/>
+              <a:defRPr sz="2400"/>
+            </a:lvl6pPr>
+            <a:lvl7pPr marL="3291840" indent="0">
+              <a:buNone/>
+              <a:defRPr sz="2400"/>
+            </a:lvl7pPr>
+            <a:lvl8pPr marL="3840480" indent="0">
+              <a:buNone/>
+              <a:defRPr sz="2400"/>
+            </a:lvl8pPr>
+            <a:lvl9pPr marL="4389120" indent="0">
+              <a:buNone/>
+              <a:defRPr sz="2400"/>
+            </a:lvl9pPr>
+          </a:lstStyle>
+          <a:p>
+            <a:r>
+              <a:rPr lang="en-US" smtClean="0"/>
+              <a:t>Drag picture to placeholder or click icon to add</a:t>
+            </a:r>
+            <a:endParaRPr lang="en-US" dirty="0"/>
+          </a:p>
+        </p:txBody>
+      </p:sp>
+      <p:sp>
+        <p:nvSpPr>
+          <p:cNvPr id="4" name="Text Placeholder 3"/>
+          <p:cNvSpPr>
+            <a:spLocks noGrp="1"/>
+          </p:cNvSpPr>
+          <p:nvPr>
+            <p:ph type="body" sz="half" idx="2"/>
+          </p:nvPr>
+        </p:nvSpPr>
+        <p:spPr>
+          <a:xfrm>
+            <a:off x="839788" y="2468880"/>
+            <a:ext cx="3932237" cy="4573906"/>
           </a:xfrm>
         </p:spPr>
         <p:txBody>
@@ -2230,129 +2293,68 @@
           <a:lstStyle>
             <a:lvl1pPr marL="0" indent="0">
               <a:buNone/>
-              <a:defRPr sz="3200"/>
+              <a:defRPr sz="1920"/>
             </a:lvl1pPr>
-            <a:lvl2pPr marL="457200" indent="0">
-              <a:buNone/>
-              <a:defRPr sz="2800"/>
+            <a:lvl2pPr marL="548640" indent="0">
+              <a:buNone/>
+              <a:defRPr sz="1680"/>
             </a:lvl2pPr>
-            <a:lvl3pPr marL="914400" indent="0">
-              <a:buNone/>
-              <a:defRPr sz="2400"/>
+            <a:lvl3pPr marL="1097280" indent="0">
+              <a:buNone/>
+              <a:defRPr sz="1440"/>
             </a:lvl3pPr>
-            <a:lvl4pPr marL="1371600" indent="0">
-              <a:buNone/>
-              <a:defRPr sz="2000"/>
+            <a:lvl4pPr marL="1645920" indent="0">
+              <a:buNone/>
+              <a:defRPr sz="1200"/>
             </a:lvl4pPr>
-            <a:lvl5pPr marL="1828800" indent="0">
-              <a:buNone/>
-              <a:defRPr sz="2000"/>
+            <a:lvl5pPr marL="2194560" indent="0">
+              <a:buNone/>
+              <a:defRPr sz="1200"/>
             </a:lvl5pPr>
-            <a:lvl6pPr marL="2286000" indent="0">
-              <a:buNone/>
-              <a:defRPr sz="2000"/>
+            <a:lvl6pPr marL="2743200" indent="0">
+              <a:buNone/>
+              <a:defRPr sz="1200"/>
             </a:lvl6pPr>
-            <a:lvl7pPr marL="2743200" indent="0">
-              <a:buNone/>
-              <a:defRPr sz="2000"/>
+            <a:lvl7pPr marL="3291840" indent="0">
+              <a:buNone/>
+              <a:defRPr sz="1200"/>
             </a:lvl7pPr>
-            <a:lvl8pPr marL="3200400" indent="0">
-              <a:buNone/>
-              <a:defRPr sz="2000"/>
+            <a:lvl8pPr marL="3840480" indent="0">
+              <a:buNone/>
+              <a:defRPr sz="1200"/>
             </a:lvl8pPr>
-            <a:lvl9pPr marL="3657600" indent="0">
-              <a:buNone/>
-              <a:defRPr sz="2000"/>
+            <a:lvl9pPr marL="4389120" indent="0">
+              <a:buNone/>
+              <a:defRPr sz="1200"/>
             </a:lvl9pPr>
           </a:lstStyle>
           <a:p>
-            <a:endParaRPr lang="en-US"/>
-          </a:p>
-        </p:txBody>
-      </p:sp>
-      <p:sp>
-        <p:nvSpPr>
-          <p:cNvPr id="4" name="Text Placeholder 3"/>
-          <p:cNvSpPr>
-            <a:spLocks noGrp="1"/>
-          </p:cNvSpPr>
-          <p:nvPr>
-            <p:ph type="body" sz="half" idx="2"/>
-          </p:nvPr>
-        </p:nvSpPr>
-        <p:spPr>
-          <a:xfrm>
-            <a:off x="839788" y="2057400"/>
-            <a:ext cx="3932237" cy="3811588"/>
-          </a:xfrm>
-        </p:spPr>
+            <a:pPr lvl="0"/>
+            <a:r>
+              <a:rPr lang="en-US" smtClean="0"/>
+              <a:t>Click to edit Master text styles</a:t>
+            </a:r>
+          </a:p>
+        </p:txBody>
+      </p:sp>
+      <p:sp>
+        <p:nvSpPr>
+          <p:cNvPr id="5" name="Date Placeholder 4"/>
+          <p:cNvSpPr>
+            <a:spLocks noGrp="1"/>
+          </p:cNvSpPr>
+          <p:nvPr>
+            <p:ph type="dt" sz="half" idx="10"/>
+          </p:nvPr>
+        </p:nvSpPr>
+        <p:spPr/>
         <p:txBody>
           <a:bodyPr/>
-          <a:lstStyle>
-            <a:lvl1pPr marL="0" indent="0">
-              <a:buNone/>
-              <a:defRPr sz="1600"/>
-            </a:lvl1pPr>
-            <a:lvl2pPr marL="457200" indent="0">
-              <a:buNone/>
-              <a:defRPr sz="1400"/>
-            </a:lvl2pPr>
-            <a:lvl3pPr marL="914400" indent="0">
-              <a:buNone/>
-              <a:defRPr sz="1200"/>
-            </a:lvl3pPr>
-            <a:lvl4pPr marL="1371600" indent="0">
-              <a:buNone/>
-              <a:defRPr sz="1000"/>
-            </a:lvl4pPr>
-            <a:lvl5pPr marL="1828800" indent="0">
-              <a:buNone/>
-              <a:defRPr sz="1000"/>
-            </a:lvl5pPr>
-            <a:lvl6pPr marL="2286000" indent="0">
-              <a:buNone/>
-              <a:defRPr sz="1000"/>
-            </a:lvl6pPr>
-            <a:lvl7pPr marL="2743200" indent="0">
-              <a:buNone/>
-              <a:defRPr sz="1000"/>
-            </a:lvl7pPr>
-            <a:lvl8pPr marL="3200400" indent="0">
-              <a:buNone/>
-              <a:defRPr sz="1000"/>
-            </a:lvl8pPr>
-            <a:lvl9pPr marL="3657600" indent="0">
-              <a:buNone/>
-              <a:defRPr sz="1000"/>
-            </a:lvl9pPr>
-          </a:lstStyle>
-          <a:p>
-            <a:pPr lvl="0"/>
-            <a:r>
-              <a:rPr lang="en-US" smtClean="0"/>
-              <a:t>Click to edit Master text styles</a:t>
-            </a:r>
-          </a:p>
-        </p:txBody>
-      </p:sp>
-      <p:sp>
-        <p:nvSpPr>
-          <p:cNvPr id="5" name="Date Placeholder 4"/>
-          <p:cNvSpPr>
-            <a:spLocks noGrp="1"/>
-          </p:cNvSpPr>
-          <p:nvPr>
-            <p:ph type="dt" sz="half" idx="10"/>
-          </p:nvPr>
-        </p:nvSpPr>
-        <p:spPr/>
-        <p:txBody>
-          <a:bodyPr/>
           <a:lstStyle/>
           <a:p>
             <a:fld id="{00F05B30-6747-364E-9DA1-A00B89AA3B88}" type="datetimeFigureOut">
               <a:rPr lang="en-US" smtClean="0"/>
-              <a:t>4/29/16</a:t>
+              <a:t>4/30/16</a:t>
             </a:fld>
             <a:endParaRPr lang="en-US"/>
           </a:p>
@@ -2403,7 +2405,7 @@
     </p:spTree>
     <p:extLst>
       <p:ext uri="{BB962C8B-B14F-4D97-AF65-F5344CB8AC3E}">
-        <p14:creationId xmlns:p14="http://schemas.microsoft.com/office/powerpoint/2010/main" val="368715782"/>
+        <p14:creationId xmlns:p14="http://schemas.microsoft.com/office/powerpoint/2010/main" val="294640465"/>
       </p:ext>
     </p:extLst>
   </p:cSld>
@@ -2447,8 +2449,8 @@
         </p:nvSpPr>
         <p:spPr>
           <a:xfrm>
-            <a:off x="838200" y="365125"/>
-            <a:ext cx="10515600" cy="1325563"/>
+            <a:off x="838200" y="438152"/>
+            <a:ext cx="10515600" cy="1590676"/>
           </a:xfrm>
           <a:prstGeom prst="rect">
             <a:avLst/>
@@ -2464,7 +2466,7 @@
               <a:rPr lang="en-US" smtClean="0"/>
               <a:t>Click to edit Master title style</a:t>
             </a:r>
-            <a:endParaRPr lang="en-US"/>
+            <a:endParaRPr lang="en-US" dirty="0"/>
           </a:p>
         </p:txBody>
       </p:sp>
@@ -2480,8 +2482,8 @@
         </p:nvSpPr>
         <p:spPr>
           <a:xfrm>
-            <a:off x="838200" y="1825625"/>
-            <a:ext cx="10515600" cy="4351338"/>
+            <a:off x="838200" y="2190750"/>
+            <a:ext cx="10515600" cy="5221606"/>
           </a:xfrm>
           <a:prstGeom prst="rect">
             <a:avLst/>
@@ -2526,7 +2528,7 @@
               <a:rPr lang="en-US" smtClean="0"/>
               <a:t>Fifth level</a:t>
             </a:r>
-            <a:endParaRPr lang="en-US"/>
+            <a:endParaRPr lang="en-US" dirty="0"/>
           </a:p>
         </p:txBody>
       </p:sp>
@@ -2542,8 +2544,8 @@
         </p:nvSpPr>
         <p:spPr>
           <a:xfrm>
-            <a:off x="838200" y="6356350"/>
-            <a:ext cx="2743200" cy="365125"/>
+            <a:off x="838200" y="7627622"/>
+            <a:ext cx="2743200" cy="438150"/>
           </a:xfrm>
           <a:prstGeom prst="rect">
             <a:avLst/>
@@ -2553,7 +2555,7 @@
           <a:bodyPr vert="horz" lIns="91440" tIns="45720" rIns="91440" bIns="45720" rtlCol="0" anchor="ctr"/>
           <a:lstStyle>
             <a:lvl1pPr algn="l">
-              <a:defRPr sz="1200">
+              <a:defRPr sz="1440">
                 <a:solidFill>
                   <a:schemeClr val="tx1">
                     <a:tint val="75000"/>
@@ -2565,7 +2567,7 @@
           <a:p>
             <a:fld id="{00F05B30-6747-364E-9DA1-A00B89AA3B88}" type="datetimeFigureOut">
               <a:rPr lang="en-US" smtClean="0"/>
-              <a:t>4/29/16</a:t>
+              <a:t>4/30/16</a:t>
             </a:fld>
             <a:endParaRPr lang="en-US"/>
           </a:p>
@@ -2583,8 +2585,8 @@
         </p:nvSpPr>
         <p:spPr>
           <a:xfrm>
-            <a:off x="4038600" y="6356350"/>
-            <a:ext cx="4114800" cy="365125"/>
+            <a:off x="4038600" y="7627622"/>
+            <a:ext cx="4114800" cy="438150"/>
           </a:xfrm>
           <a:prstGeom prst="rect">
             <a:avLst/>
@@ -2594,7 +2596,7 @@
           <a:bodyPr vert="horz" lIns="91440" tIns="45720" rIns="91440" bIns="45720" rtlCol="0" anchor="ctr"/>
           <a:lstStyle>
             <a:lvl1pPr algn="ctr">
-              <a:defRPr sz="1200">
+              <a:defRPr sz="1440">
                 <a:solidFill>
                   <a:schemeClr val="tx1">
                     <a:tint val="75000"/>
@@ -2620,8 +2622,8 @@
         </p:nvSpPr>
         <p:spPr>
           <a:xfrm>
-            <a:off x="8610600" y="6356350"/>
-            <a:ext cx="2743200" cy="365125"/>
+            <a:off x="8610600" y="7627622"/>
+            <a:ext cx="2743200" cy="438150"/>
           </a:xfrm>
           <a:prstGeom prst="rect">
             <a:avLst/>
@@ -2631,7 +2633,7 @@
           <a:bodyPr vert="horz" lIns="91440" tIns="45720" rIns="91440" bIns="45720" rtlCol="0" anchor="ctr"/>
           <a:lstStyle>
             <a:lvl1pPr algn="r">
-              <a:defRPr sz="1200">
+              <a:defRPr sz="1440">
                 <a:solidFill>
                   <a:schemeClr val="tx1">
                     <a:tint val="75000"/>
@@ -2652,27 +2654,27 @@
     </p:spTree>
     <p:extLst>
       <p:ext uri="{BB962C8B-B14F-4D97-AF65-F5344CB8AC3E}">
-        <p14:creationId xmlns:p14="http://schemas.microsoft.com/office/powerpoint/2010/main" val="504489702"/>
+        <p14:creationId xmlns:p14="http://schemas.microsoft.com/office/powerpoint/2010/main" val="1718282791"/>
       </p:ext>
     </p:extLst>
   </p:cSld>
   <p:clrMap bg1="lt1" tx1="dk1" bg2="lt2" tx2="dk2" accent1="accent1" accent2="accent2" accent3="accent3" accent4="accent4" accent5="accent5" accent6="accent6" hlink="hlink" folHlink="folHlink"/>
   <p:sldLayoutIdLst>
-    <p:sldLayoutId id="2147483649" r:id="rId1"/>
-    <p:sldLayoutId id="2147483650" r:id="rId2"/>
-    <p:sldLayoutId id="2147483651" r:id="rId3"/>
-    <p:sldLayoutId id="2147483652" r:id="rId4"/>
-    <p:sldLayoutId id="2147483653" r:id="rId5"/>
-    <p:sldLayoutId id="2147483654" r:id="rId6"/>
-    <p:sldLayoutId id="2147483655" r:id="rId7"/>
-    <p:sldLayoutId id="2147483656" r:id="rId8"/>
-    <p:sldLayoutId id="2147483657" r:id="rId9"/>
-    <p:sldLayoutId id="2147483658" r:id="rId10"/>
-    <p:sldLayoutId id="2147483659" r:id="rId11"/>
+    <p:sldLayoutId id="2147483661" r:id="rId1"/>
+    <p:sldLayoutId id="2147483662" r:id="rId2"/>
+    <p:sldLayoutId id="2147483663" r:id="rId3"/>
+    <p:sldLayoutId id="2147483664" r:id="rId4"/>
+    <p:sldLayoutId id="2147483665" r:id="rId5"/>
+    <p:sldLayoutId id="2147483666" r:id="rId6"/>
+    <p:sldLayoutId id="2147483667" r:id="rId7"/>
+    <p:sldLayoutId id="2147483668" r:id="rId8"/>
+    <p:sldLayoutId id="2147483669" r:id="rId9"/>
+    <p:sldLayoutId id="2147483670" r:id="rId10"/>
+    <p:sldLayoutId id="2147483671" r:id="rId11"/>
   </p:sldLayoutIdLst>
   <p:txStyles>
     <p:titleStyle>
-      <a:lvl1pPr algn="l" defTabSz="914400" rtl="0" eaLnBrk="1" latinLnBrk="0" hangingPunct="1">
+      <a:lvl1pPr algn="l" defTabSz="1097280" rtl="0" eaLnBrk="1" latinLnBrk="0" hangingPunct="1">
         <a:lnSpc>
           <a:spcPct val="90000"/>
         </a:lnSpc>
@@ -2680,7 +2682,7 @@
           <a:spcPct val="0"/>
         </a:spcBef>
         <a:buNone/>
-        <a:defRPr sz="4400" kern="1200">
+        <a:defRPr sz="5280" kern="1200">
           <a:solidFill>
             <a:schemeClr val="tx1"/>
           </a:solidFill>
@@ -2691,16 +2693,16 @@
       </a:lvl1pPr>
     </p:titleStyle>
     <p:bodyStyle>
-      <a:lvl1pPr marL="228600" indent="-228600" algn="l" defTabSz="914400" rtl="0" eaLnBrk="1" latinLnBrk="0" hangingPunct="1">
+      <a:lvl1pPr marL="274320" indent="-274320" algn="l" defTabSz="1097280" rtl="0" eaLnBrk="1" latinLnBrk="0" hangingPunct="1">
         <a:lnSpc>
           <a:spcPct val="90000"/>
         </a:lnSpc>
         <a:spcBef>
-          <a:spcPts val="1000"/>
+          <a:spcPts val="1200"/>
         </a:spcBef>
-        <a:buFont typeface="Arial"/>
+        <a:buFont typeface="Arial" panose="020B0604020202020204" pitchFamily="34" charset="0"/>
         <a:buChar char="•"/>
-        <a:defRPr sz="2800" kern="1200">
+        <a:defRPr sz="3360" kern="1200">
           <a:solidFill>
             <a:schemeClr val="tx1"/>
           </a:solidFill>
@@ -2709,14 +2711,32 @@
           <a:cs typeface="+mn-cs"/>
         </a:defRPr>
       </a:lvl1pPr>
-      <a:lvl2pPr marL="685800" indent="-228600" algn="l" defTabSz="914400" rtl="0" eaLnBrk="1" latinLnBrk="0" hangingPunct="1">
+      <a:lvl2pPr marL="822960" indent="-274320" algn="l" defTabSz="1097280" rtl="0" eaLnBrk="1" latinLnBrk="0" hangingPunct="1">
         <a:lnSpc>
           <a:spcPct val="90000"/>
         </a:lnSpc>
         <a:spcBef>
-          <a:spcPts val="500"/>
+          <a:spcPts val="600"/>
         </a:spcBef>
-        <a:buFont typeface="Arial"/>
+        <a:buFont typeface="Arial" panose="020B0604020202020204" pitchFamily="34" charset="0"/>
+        <a:buChar char="•"/>
+        <a:defRPr sz="2880" kern="1200">
+          <a:solidFill>
+            <a:schemeClr val="tx1"/>
+          </a:solidFill>
+          <a:latin typeface="+mn-lt"/>
+          <a:ea typeface="+mn-ea"/>
+          <a:cs typeface="+mn-cs"/>
+        </a:defRPr>
+      </a:lvl2pPr>
+      <a:lvl3pPr marL="1371600" indent="-274320" algn="l" defTabSz="1097280" rtl="0" eaLnBrk="1" latinLnBrk="0" hangingPunct="1">
+        <a:lnSpc>
+          <a:spcPct val="90000"/>
+        </a:lnSpc>
+        <a:spcBef>
+          <a:spcPts val="600"/>
+        </a:spcBef>
+        <a:buFont typeface="Arial" panose="020B0604020202020204" pitchFamily="34" charset="0"/>
         <a:buChar char="•"/>
         <a:defRPr sz="2400" kern="1200">
           <a:solidFill>
@@ -2726,35 +2746,17 @@
           <a:ea typeface="+mn-ea"/>
           <a:cs typeface="+mn-cs"/>
         </a:defRPr>
-      </a:lvl2pPr>
-      <a:lvl3pPr marL="1143000" indent="-228600" algn="l" defTabSz="914400" rtl="0" eaLnBrk="1" latinLnBrk="0" hangingPunct="1">
+      </a:lvl3pPr>
+      <a:lvl4pPr marL="1920240" indent="-274320" algn="l" defTabSz="1097280" rtl="0" eaLnBrk="1" latinLnBrk="0" hangingPunct="1">
         <a:lnSpc>
           <a:spcPct val="90000"/>
         </a:lnSpc>
         <a:spcBef>
-          <a:spcPts val="500"/>
+          <a:spcPts val="600"/>
         </a:spcBef>
-        <a:buFont typeface="Arial"/>
+        <a:buFont typeface="Arial" panose="020B0604020202020204" pitchFamily="34" charset="0"/>
         <a:buChar char="•"/>
-        <a:defRPr sz="2000" kern="1200">
-          <a:solidFill>
-            <a:schemeClr val="tx1"/>
-          </a:solidFill>
-          <a:latin typeface="+mn-lt"/>
-          <a:ea typeface="+mn-ea"/>
-          <a:cs typeface="+mn-cs"/>
-        </a:defRPr>
-      </a:lvl3pPr>
-      <a:lvl4pPr marL="1600200" indent="-228600" algn="l" defTabSz="914400" rtl="0" eaLnBrk="1" latinLnBrk="0" hangingPunct="1">
-        <a:lnSpc>
-          <a:spcPct val="90000"/>
-        </a:lnSpc>
-        <a:spcBef>
-          <a:spcPts val="500"/>
-        </a:spcBef>
-        <a:buFont typeface="Arial"/>
-        <a:buChar char="•"/>
-        <a:defRPr sz="1800" kern="1200">
+        <a:defRPr sz="2160" kern="1200">
           <a:solidFill>
             <a:schemeClr val="tx1"/>
           </a:solidFill>
@@ -2763,16 +2765,16 @@
           <a:cs typeface="+mn-cs"/>
         </a:defRPr>
       </a:lvl4pPr>
-      <a:lvl5pPr marL="2057400" indent="-228600" algn="l" defTabSz="914400" rtl="0" eaLnBrk="1" latinLnBrk="0" hangingPunct="1">
+      <a:lvl5pPr marL="2468880" indent="-274320" algn="l" defTabSz="1097280" rtl="0" eaLnBrk="1" latinLnBrk="0" hangingPunct="1">
         <a:lnSpc>
           <a:spcPct val="90000"/>
         </a:lnSpc>
         <a:spcBef>
-          <a:spcPts val="500"/>
+          <a:spcPts val="600"/>
         </a:spcBef>
-        <a:buFont typeface="Arial"/>
+        <a:buFont typeface="Arial" panose="020B0604020202020204" pitchFamily="34" charset="0"/>
         <a:buChar char="•"/>
-        <a:defRPr sz="1800" kern="1200">
+        <a:defRPr sz="2160" kern="1200">
           <a:solidFill>
             <a:schemeClr val="tx1"/>
           </a:solidFill>
@@ -2781,16 +2783,16 @@
           <a:cs typeface="+mn-cs"/>
         </a:defRPr>
       </a:lvl5pPr>
-      <a:lvl6pPr marL="2514600" indent="-228600" algn="l" defTabSz="914400" rtl="0" eaLnBrk="1" latinLnBrk="0" hangingPunct="1">
+      <a:lvl6pPr marL="3017520" indent="-274320" algn="l" defTabSz="1097280" rtl="0" eaLnBrk="1" latinLnBrk="0" hangingPunct="1">
         <a:lnSpc>
           <a:spcPct val="90000"/>
         </a:lnSpc>
         <a:spcBef>
-          <a:spcPts val="500"/>
+          <a:spcPts val="600"/>
         </a:spcBef>
-        <a:buFont typeface="Arial"/>
+        <a:buFont typeface="Arial" panose="020B0604020202020204" pitchFamily="34" charset="0"/>
         <a:buChar char="•"/>
-        <a:defRPr sz="1800" kern="1200">
+        <a:defRPr sz="2160" kern="1200">
           <a:solidFill>
             <a:schemeClr val="tx1"/>
           </a:solidFill>
@@ -2799,16 +2801,16 @@
           <a:cs typeface="+mn-cs"/>
         </a:defRPr>
       </a:lvl6pPr>
-      <a:lvl7pPr marL="2971800" indent="-228600" algn="l" defTabSz="914400" rtl="0" eaLnBrk="1" latinLnBrk="0" hangingPunct="1">
+      <a:lvl7pPr marL="3566160" indent="-274320" algn="l" defTabSz="1097280" rtl="0" eaLnBrk="1" latinLnBrk="0" hangingPunct="1">
         <a:lnSpc>
           <a:spcPct val="90000"/>
         </a:lnSpc>
         <a:spcBef>
-          <a:spcPts val="500"/>
+          <a:spcPts val="600"/>
         </a:spcBef>
-        <a:buFont typeface="Arial"/>
+        <a:buFont typeface="Arial" panose="020B0604020202020204" pitchFamily="34" charset="0"/>
         <a:buChar char="•"/>
-        <a:defRPr sz="1800" kern="1200">
+        <a:defRPr sz="2160" kern="1200">
           <a:solidFill>
             <a:schemeClr val="tx1"/>
           </a:solidFill>
@@ -2817,16 +2819,16 @@
           <a:cs typeface="+mn-cs"/>
         </a:defRPr>
       </a:lvl7pPr>
-      <a:lvl8pPr marL="3429000" indent="-228600" algn="l" defTabSz="914400" rtl="0" eaLnBrk="1" latinLnBrk="0" hangingPunct="1">
+      <a:lvl8pPr marL="4114800" indent="-274320" algn="l" defTabSz="1097280" rtl="0" eaLnBrk="1" latinLnBrk="0" hangingPunct="1">
         <a:lnSpc>
           <a:spcPct val="90000"/>
         </a:lnSpc>
         <a:spcBef>
-          <a:spcPts val="500"/>
+          <a:spcPts val="600"/>
         </a:spcBef>
-        <a:buFont typeface="Arial"/>
+        <a:buFont typeface="Arial" panose="020B0604020202020204" pitchFamily="34" charset="0"/>
         <a:buChar char="•"/>
-        <a:defRPr sz="1800" kern="1200">
+        <a:defRPr sz="2160" kern="1200">
           <a:solidFill>
             <a:schemeClr val="tx1"/>
           </a:solidFill>
@@ -2835,16 +2837,16 @@
           <a:cs typeface="+mn-cs"/>
         </a:defRPr>
       </a:lvl8pPr>
-      <a:lvl9pPr marL="3886200" indent="-228600" algn="l" defTabSz="914400" rtl="0" eaLnBrk="1" latinLnBrk="0" hangingPunct="1">
+      <a:lvl9pPr marL="4663440" indent="-274320" algn="l" defTabSz="1097280" rtl="0" eaLnBrk="1" latinLnBrk="0" hangingPunct="1">
         <a:lnSpc>
           <a:spcPct val="90000"/>
         </a:lnSpc>
         <a:spcBef>
-          <a:spcPts val="500"/>
+          <a:spcPts val="600"/>
         </a:spcBef>
-        <a:buFont typeface="Arial"/>
+        <a:buFont typeface="Arial" panose="020B0604020202020204" pitchFamily="34" charset="0"/>
         <a:buChar char="•"/>
-        <a:defRPr sz="1800" kern="1200">
+        <a:defRPr sz="2160" kern="1200">
           <a:solidFill>
             <a:schemeClr val="tx1"/>
           </a:solidFill>
@@ -2858,8 +2860,8 @@
       <a:defPPr>
         <a:defRPr lang="en-US"/>
       </a:defPPr>
-      <a:lvl1pPr marL="0" algn="l" defTabSz="914400" rtl="0" eaLnBrk="1" latinLnBrk="0" hangingPunct="1">
-        <a:defRPr sz="1800" kern="1200">
+      <a:lvl1pPr marL="0" algn="l" defTabSz="1097280" rtl="0" eaLnBrk="1" latinLnBrk="0" hangingPunct="1">
+        <a:defRPr sz="2160" kern="1200">
           <a:solidFill>
             <a:schemeClr val="tx1"/>
           </a:solidFill>
@@ -2868,8 +2870,8 @@
           <a:cs typeface="+mn-cs"/>
         </a:defRPr>
       </a:lvl1pPr>
-      <a:lvl2pPr marL="457200" algn="l" defTabSz="914400" rtl="0" eaLnBrk="1" latinLnBrk="0" hangingPunct="1">
-        <a:defRPr sz="1800" kern="1200">
+      <a:lvl2pPr marL="548640" algn="l" defTabSz="1097280" rtl="0" eaLnBrk="1" latinLnBrk="0" hangingPunct="1">
+        <a:defRPr sz="2160" kern="1200">
           <a:solidFill>
             <a:schemeClr val="tx1"/>
           </a:solidFill>
@@ -2878,8 +2880,8 @@
           <a:cs typeface="+mn-cs"/>
         </a:defRPr>
       </a:lvl2pPr>
-      <a:lvl3pPr marL="914400" algn="l" defTabSz="914400" rtl="0" eaLnBrk="1" latinLnBrk="0" hangingPunct="1">
-        <a:defRPr sz="1800" kern="1200">
+      <a:lvl3pPr marL="1097280" algn="l" defTabSz="1097280" rtl="0" eaLnBrk="1" latinLnBrk="0" hangingPunct="1">
+        <a:defRPr sz="2160" kern="1200">
           <a:solidFill>
             <a:schemeClr val="tx1"/>
           </a:solidFill>
@@ -2888,8 +2890,8 @@
           <a:cs typeface="+mn-cs"/>
         </a:defRPr>
       </a:lvl3pPr>
-      <a:lvl4pPr marL="1371600" algn="l" defTabSz="914400" rtl="0" eaLnBrk="1" latinLnBrk="0" hangingPunct="1">
-        <a:defRPr sz="1800" kern="1200">
+      <a:lvl4pPr marL="1645920" algn="l" defTabSz="1097280" rtl="0" eaLnBrk="1" latinLnBrk="0" hangingPunct="1">
+        <a:defRPr sz="2160" kern="1200">
           <a:solidFill>
             <a:schemeClr val="tx1"/>
           </a:solidFill>
@@ -2898,8 +2900,8 @@
           <a:cs typeface="+mn-cs"/>
         </a:defRPr>
       </a:lvl4pPr>
-      <a:lvl5pPr marL="1828800" algn="l" defTabSz="914400" rtl="0" eaLnBrk="1" latinLnBrk="0" hangingPunct="1">
-        <a:defRPr sz="1800" kern="1200">
+      <a:lvl5pPr marL="2194560" algn="l" defTabSz="1097280" rtl="0" eaLnBrk="1" latinLnBrk="0" hangingPunct="1">
+        <a:defRPr sz="2160" kern="1200">
           <a:solidFill>
             <a:schemeClr val="tx1"/>
           </a:solidFill>
@@ -2908,8 +2910,8 @@
           <a:cs typeface="+mn-cs"/>
         </a:defRPr>
       </a:lvl5pPr>
-      <a:lvl6pPr marL="2286000" algn="l" defTabSz="914400" rtl="0" eaLnBrk="1" latinLnBrk="0" hangingPunct="1">
-        <a:defRPr sz="1800" kern="1200">
+      <a:lvl6pPr marL="2743200" algn="l" defTabSz="1097280" rtl="0" eaLnBrk="1" latinLnBrk="0" hangingPunct="1">
+        <a:defRPr sz="2160" kern="1200">
           <a:solidFill>
             <a:schemeClr val="tx1"/>
           </a:solidFill>
@@ -2918,8 +2920,8 @@
           <a:cs typeface="+mn-cs"/>
         </a:defRPr>
       </a:lvl6pPr>
-      <a:lvl7pPr marL="2743200" algn="l" defTabSz="914400" rtl="0" eaLnBrk="1" latinLnBrk="0" hangingPunct="1">
-        <a:defRPr sz="1800" kern="1200">
+      <a:lvl7pPr marL="3291840" algn="l" defTabSz="1097280" rtl="0" eaLnBrk="1" latinLnBrk="0" hangingPunct="1">
+        <a:defRPr sz="2160" kern="1200">
           <a:solidFill>
             <a:schemeClr val="tx1"/>
           </a:solidFill>
@@ -2928,8 +2930,8 @@
           <a:cs typeface="+mn-cs"/>
         </a:defRPr>
       </a:lvl7pPr>
-      <a:lvl8pPr marL="3200400" algn="l" defTabSz="914400" rtl="0" eaLnBrk="1" latinLnBrk="0" hangingPunct="1">
-        <a:defRPr sz="1800" kern="1200">
+      <a:lvl8pPr marL="3840480" algn="l" defTabSz="1097280" rtl="0" eaLnBrk="1" latinLnBrk="0" hangingPunct="1">
+        <a:defRPr sz="2160" kern="1200">
           <a:solidFill>
             <a:schemeClr val="tx1"/>
           </a:solidFill>
@@ -2938,8 +2940,8 @@
           <a:cs typeface="+mn-cs"/>
         </a:defRPr>
       </a:lvl8pPr>
-      <a:lvl9pPr marL="3657600" algn="l" defTabSz="914400" rtl="0" eaLnBrk="1" latinLnBrk="0" hangingPunct="1">
-        <a:defRPr sz="1800" kern="1200">
+      <a:lvl9pPr marL="4389120" algn="l" defTabSz="1097280" rtl="0" eaLnBrk="1" latinLnBrk="0" hangingPunct="1">
+        <a:defRPr sz="2160" kern="1200">
           <a:solidFill>
             <a:schemeClr val="tx1"/>
           </a:solidFill>
@@ -2978,7 +2980,7 @@
         </p:nvSpPr>
         <p:spPr>
           <a:xfrm>
-            <a:off x="452438" y="1627614"/>
+            <a:off x="452438" y="2313414"/>
             <a:ext cx="3986212" cy="1477328"/>
           </a:xfrm>
           <a:prstGeom prst="rect">
@@ -3002,31 +3004,31 @@
               <a:t>a</a:t>
             </a:r>
             <a:r>
-              <a:rPr lang="en-US" b="1" dirty="0" smtClean="0"/>
+              <a:rPr lang="en-US" b="1" dirty="0"/>
               <a:t>rk:/21547/R2MBIO56</a:t>
             </a:r>
           </a:p>
           <a:p>
             <a:r>
-              <a:rPr lang="en-US" i="1" dirty="0" smtClean="0"/>
+              <a:rPr lang="en-US" i="1" dirty="0"/>
               <a:t>   ark = scheme</a:t>
             </a:r>
           </a:p>
           <a:p>
             <a:r>
-              <a:rPr lang="en-US" i="1" dirty="0" smtClean="0"/>
+              <a:rPr lang="en-US" i="1" dirty="0"/>
               <a:t>   21547 = naan</a:t>
             </a:r>
           </a:p>
           <a:p>
             <a:r>
-              <a:rPr lang="en-US" i="1" dirty="0" smtClean="0"/>
+              <a:rPr lang="en-US" i="1" dirty="0"/>
               <a:t>   R2 = shoulder</a:t>
             </a:r>
           </a:p>
           <a:p>
             <a:r>
-              <a:rPr lang="en-US" i="1" dirty="0" smtClean="0"/>
+              <a:rPr lang="en-US" i="1" dirty="0"/>
               <a:t>   MBIO56 = researcher’s identifier</a:t>
             </a:r>
             <a:endParaRPr lang="en-US" i="1" dirty="0"/>
@@ -3041,7 +3043,7 @@
         </p:nvSpPr>
         <p:spPr>
           <a:xfrm>
-            <a:off x="6286500" y="1627614"/>
+            <a:off x="6286500" y="2313415"/>
             <a:ext cx="4905382" cy="646331"/>
           </a:xfrm>
           <a:prstGeom prst="rect">
@@ -3061,13 +3063,13 @@
           <a:lstStyle/>
           <a:p>
             <a:r>
-              <a:rPr lang="en-US" b="1" dirty="0" smtClean="0"/>
+              <a:rPr lang="en-US" b="1" dirty="0"/>
               <a:t>Name-to-thing resolver (California Digital Library)</a:t>
             </a:r>
           </a:p>
           <a:p>
             <a:r>
-              <a:rPr lang="en-US" dirty="0" smtClean="0"/>
+              <a:rPr lang="en-US" dirty="0"/>
               <a:t>http://n2t.net/ark:/21547/R2MBIO56</a:t>
             </a:r>
             <a:endParaRPr lang="en-US" dirty="0"/>
@@ -3082,7 +3084,7 @@
         </p:nvSpPr>
         <p:spPr>
           <a:xfrm>
-            <a:off x="6286500" y="2781776"/>
+            <a:off x="6286500" y="3467577"/>
             <a:ext cx="4905382" cy="646331"/>
           </a:xfrm>
           <a:prstGeom prst="rect">
@@ -3104,29 +3106,29 @@
           <a:lstStyle/>
           <a:p>
             <a:r>
-              <a:rPr lang="en-US" b="1" dirty="0" smtClean="0"/>
+              <a:rPr lang="en-US" b="1" dirty="0"/>
               <a:t>BCID resolver (</a:t>
             </a:r>
             <a:r>
-              <a:rPr lang="en-US" b="1" dirty="0" err="1" smtClean="0"/>
+              <a:rPr lang="en-US" b="1" dirty="0" err="1"/>
               <a:t>Biocode</a:t>
             </a:r>
             <a:r>
-              <a:rPr lang="en-US" b="1" dirty="0" smtClean="0"/>
+              <a:rPr lang="en-US" b="1" dirty="0"/>
               <a:t> Commons)</a:t>
             </a:r>
           </a:p>
           <a:p>
             <a:r>
-              <a:rPr lang="en-US" dirty="0" smtClean="0"/>
+              <a:rPr lang="en-US" dirty="0"/>
               <a:t>http://</a:t>
             </a:r>
             <a:r>
-              <a:rPr lang="en-US" dirty="0" err="1" smtClean="0"/>
+              <a:rPr lang="en-US" dirty="0" err="1"/>
               <a:t>biscicol.org</a:t>
             </a:r>
             <a:r>
-              <a:rPr lang="en-US" dirty="0" smtClean="0"/>
+              <a:rPr lang="en-US" dirty="0"/>
               <a:t>/id/ark:/21547/R2MBIO56</a:t>
             </a:r>
             <a:endParaRPr lang="en-US" dirty="0"/>
@@ -3141,7 +3143,7 @@
         </p:nvSpPr>
         <p:spPr>
           <a:xfrm>
-            <a:off x="6286500" y="5485924"/>
+            <a:off x="6286500" y="6171725"/>
             <a:ext cx="4905382" cy="646331"/>
           </a:xfrm>
           <a:prstGeom prst="rect">
@@ -3163,22 +3165,22 @@
           <a:lstStyle/>
           <a:p>
             <a:r>
-              <a:rPr lang="en-US" b="1" smtClean="0"/>
+              <a:rPr lang="en-US" b="1"/>
               <a:t>Project Resolution</a:t>
             </a:r>
-            <a:endParaRPr lang="en-US" b="1" dirty="0" smtClean="0"/>
-          </a:p>
-          <a:p>
-            <a:r>
-              <a:rPr lang="en-US" dirty="0" smtClean="0"/>
+            <a:endParaRPr lang="en-US" b="1" dirty="0"/>
+          </a:p>
+          <a:p>
+            <a:r>
+              <a:rPr lang="en-US" dirty="0"/>
               <a:t>http://</a:t>
             </a:r>
             <a:r>
-              <a:rPr lang="en-US" dirty="0" err="1" smtClean="0"/>
+              <a:rPr lang="en-US" dirty="0" err="1"/>
               <a:t>biscicol.org</a:t>
             </a:r>
             <a:r>
-              <a:rPr lang="en-US" dirty="0" smtClean="0"/>
+              <a:rPr lang="en-US" dirty="0"/>
               <a:t>/id/ark:/21547/R2MBIO56</a:t>
             </a:r>
             <a:endParaRPr lang="en-US" dirty="0"/>
@@ -3195,7 +3197,7 @@
         </p:nvCxnSpPr>
         <p:spPr>
           <a:xfrm>
-            <a:off x="4438650" y="1950779"/>
+            <a:off x="4438650" y="2636580"/>
             <a:ext cx="1847850" cy="1"/>
           </a:xfrm>
           <a:prstGeom prst="straightConnector1">
@@ -3228,7 +3230,7 @@
         </p:nvCxnSpPr>
         <p:spPr>
           <a:xfrm>
-            <a:off x="4438650" y="2973302"/>
+            <a:off x="4438650" y="3659103"/>
             <a:ext cx="1847850" cy="1"/>
           </a:xfrm>
           <a:prstGeom prst="straightConnector1">
@@ -3264,7 +3266,7 @@
         </p:nvCxnSpPr>
         <p:spPr>
           <a:xfrm>
-            <a:off x="8739191" y="2273945"/>
+            <a:off x="8739191" y="2959746"/>
             <a:ext cx="0" cy="507831"/>
           </a:xfrm>
           <a:prstGeom prst="straightConnector1">
@@ -3299,7 +3301,7 @@
         </p:nvCxnSpPr>
         <p:spPr>
           <a:xfrm>
-            <a:off x="8739191" y="3428107"/>
+            <a:off x="8739191" y="4113907"/>
             <a:ext cx="0" cy="814536"/>
           </a:xfrm>
           <a:prstGeom prst="straightConnector1">
@@ -3334,7 +3336,7 @@
         </p:nvCxnSpPr>
         <p:spPr>
           <a:xfrm>
-            <a:off x="8739191" y="4611975"/>
+            <a:off x="8739191" y="5297776"/>
             <a:ext cx="0" cy="873949"/>
           </a:xfrm>
           <a:prstGeom prst="straightConnector1">
@@ -3367,7 +3369,7 @@
         </p:nvSpPr>
         <p:spPr>
           <a:xfrm>
-            <a:off x="4495800" y="103287"/>
+            <a:off x="4495801" y="789088"/>
             <a:ext cx="2849883" cy="584775"/>
           </a:xfrm>
           <a:prstGeom prst="rect">
@@ -3382,7 +3384,7 @@
           <a:lstStyle/>
           <a:p>
             <a:r>
-              <a:rPr lang="en-US" sz="3200" smtClean="0"/>
+              <a:rPr lang="en-US" sz="3200"/>
               <a:t>BCID Resolution</a:t>
             </a:r>
             <a:endParaRPr lang="en-US" sz="3200" dirty="0"/>
@@ -3397,7 +3399,7 @@
         </p:nvSpPr>
         <p:spPr>
           <a:xfrm>
-            <a:off x="762000" y="1123950"/>
+            <a:off x="762001" y="1809750"/>
             <a:ext cx="3524363" cy="369332"/>
           </a:xfrm>
           <a:prstGeom prst="rect">
@@ -3412,7 +3414,7 @@
           <a:lstStyle/>
           <a:p>
             <a:r>
-              <a:rPr lang="en-US" dirty="0" smtClean="0"/>
+              <a:rPr lang="en-US" dirty="0"/>
               <a:t>GUID (presented only with scheme)</a:t>
             </a:r>
             <a:endParaRPr lang="en-US" dirty="0"/>
@@ -3427,7 +3429,7 @@
         </p:nvSpPr>
         <p:spPr>
           <a:xfrm>
-            <a:off x="6381694" y="1142866"/>
+            <a:off x="6381694" y="1828666"/>
             <a:ext cx="1997406" cy="369332"/>
           </a:xfrm>
           <a:prstGeom prst="rect">
@@ -3442,7 +3444,7 @@
           <a:lstStyle/>
           <a:p>
             <a:r>
-              <a:rPr lang="en-US" dirty="0" smtClean="0"/>
+              <a:rPr lang="en-US" dirty="0"/>
               <a:t>Resolution Services</a:t>
             </a:r>
             <a:endParaRPr lang="en-US" dirty="0"/>
@@ -3457,7 +3459,7 @@
         </p:nvSpPr>
         <p:spPr>
           <a:xfrm>
-            <a:off x="7667843" y="4242643"/>
+            <a:off x="7667843" y="4928443"/>
             <a:ext cx="2499146" cy="369332"/>
           </a:xfrm>
           <a:prstGeom prst="rect">
@@ -3472,11 +3474,11 @@
           <a:lstStyle/>
           <a:p>
             <a:r>
-              <a:rPr lang="en-US" dirty="0" smtClean="0"/>
+              <a:rPr lang="en-US" dirty="0"/>
               <a:t>BCID </a:t>
             </a:r>
             <a:r>
-              <a:rPr lang="en-US" smtClean="0"/>
+              <a:rPr lang="en-US"/>
               <a:t>Resolution Services</a:t>
             </a:r>
             <a:endParaRPr lang="en-US"/>
@@ -3521,7 +3523,7 @@
         </p:nvSpPr>
         <p:spPr>
           <a:xfrm>
-            <a:off x="3759220" y="11393"/>
+            <a:off x="3775262" y="119679"/>
             <a:ext cx="4299510" cy="584775"/>
           </a:xfrm>
           <a:prstGeom prst="rect">
@@ -3536,7 +3538,7 @@
           <a:lstStyle/>
           <a:p>
             <a:r>
-              <a:rPr lang="en-US" sz="3200" dirty="0" smtClean="0"/>
+              <a:rPr lang="en-US" sz="3200" dirty="0"/>
               <a:t>BCID Resolution Services</a:t>
             </a:r>
             <a:endParaRPr lang="en-US" sz="3200" dirty="0"/>
@@ -3551,7 +3553,7 @@
         </p:nvSpPr>
         <p:spPr>
           <a:xfrm>
-            <a:off x="476250" y="1257300"/>
+            <a:off x="492292" y="1365586"/>
             <a:ext cx="2291012" cy="646331"/>
           </a:xfrm>
           <a:prstGeom prst="rect">
@@ -3566,21 +3568,21 @@
           <a:lstStyle/>
           <a:p>
             <a:r>
-              <a:rPr lang="en-US" u="sng" dirty="0" smtClean="0"/>
+              <a:rPr lang="en-US" u="sng" dirty="0"/>
               <a:t>Expedition</a:t>
             </a:r>
           </a:p>
           <a:p>
             <a:r>
-              <a:rPr lang="en-US" dirty="0" smtClean="0"/>
+              <a:rPr lang="en-US" dirty="0"/>
               <a:t>&lt;</a:t>
             </a:r>
             <a:r>
-              <a:rPr lang="en-US" dirty="0" err="1" smtClean="0"/>
+              <a:rPr lang="en-US" dirty="0" err="1"/>
               <a:t>dcmitype:Collection</a:t>
             </a:r>
             <a:r>
-              <a:rPr lang="en-US" dirty="0" smtClean="0"/>
+              <a:rPr lang="en-US" dirty="0"/>
               <a:t>&gt;</a:t>
             </a:r>
             <a:endParaRPr lang="en-US" dirty="0"/>
@@ -3595,7 +3597,7 @@
         </p:nvSpPr>
         <p:spPr>
           <a:xfrm>
-            <a:off x="506321" y="2203498"/>
+            <a:off x="522364" y="2311784"/>
             <a:ext cx="2070247" cy="646331"/>
           </a:xfrm>
           <a:prstGeom prst="rect">
@@ -3610,21 +3612,21 @@
           <a:lstStyle/>
           <a:p>
             <a:r>
-              <a:rPr lang="en-US" u="sng" dirty="0" smtClean="0"/>
+              <a:rPr lang="en-US" u="sng" dirty="0"/>
               <a:t>Dataset</a:t>
             </a:r>
           </a:p>
           <a:p>
             <a:r>
-              <a:rPr lang="en-US" dirty="0" smtClean="0"/>
+              <a:rPr lang="en-US" dirty="0"/>
               <a:t>&lt;</a:t>
             </a:r>
             <a:r>
-              <a:rPr lang="en-US" dirty="0" err="1" smtClean="0"/>
+              <a:rPr lang="en-US" dirty="0" err="1"/>
               <a:t>dcmitype:Dataset</a:t>
             </a:r>
             <a:r>
-              <a:rPr lang="en-US" dirty="0" smtClean="0"/>
+              <a:rPr lang="en-US" dirty="0"/>
               <a:t>&gt;</a:t>
             </a:r>
             <a:endParaRPr lang="en-US" dirty="0"/>
@@ -3639,8 +3641,8 @@
         </p:nvSpPr>
         <p:spPr>
           <a:xfrm>
-            <a:off x="506321" y="3384598"/>
-            <a:ext cx="2329420" cy="646331"/>
+            <a:off x="522363" y="3492884"/>
+            <a:ext cx="2071336" cy="646331"/>
           </a:xfrm>
           <a:prstGeom prst="rect">
             <a:avLst/>
@@ -3654,22 +3656,18 @@
           <a:lstStyle/>
           <a:p>
             <a:r>
-              <a:rPr lang="en-US" u="sng" dirty="0" smtClean="0"/>
-              <a:t>Resource</a:t>
-            </a:r>
-          </a:p>
-          <a:p>
-            <a:r>
               <a:rPr lang="en-US" dirty="0" smtClean="0"/>
-              <a:t>&lt;defined in </a:t>
-            </a:r>
+              <a:t>{resource defined in</a:t>
+            </a:r>
+          </a:p>
+          <a:p>
             <a:r>
               <a:rPr lang="en-US" dirty="0" err="1" smtClean="0"/>
-              <a:t>config</a:t>
+              <a:t>configFile</a:t>
             </a:r>
             <a:r>
               <a:rPr lang="en-US" dirty="0" smtClean="0"/>
-              <a:t> file&gt;</a:t>
+              <a:t>}</a:t>
             </a:r>
             <a:endParaRPr lang="en-US" dirty="0"/>
           </a:p>
@@ -3683,8 +3681,8 @@
         </p:nvSpPr>
         <p:spPr>
           <a:xfrm>
-            <a:off x="501721" y="706309"/>
-            <a:ext cx="881203" cy="369332"/>
+            <a:off x="517764" y="814594"/>
+            <a:ext cx="1444050" cy="369332"/>
           </a:xfrm>
           <a:prstGeom prst="rect">
             <a:avLst/>
@@ -3698,10 +3696,10 @@
           <a:lstStyle/>
           <a:p>
             <a:r>
-              <a:rPr lang="en-US" u="sng" smtClean="0"/>
-              <a:t>ID Type</a:t>
-            </a:r>
-            <a:endParaRPr lang="en-US" u="sng"/>
+              <a:rPr lang="en-US" u="sng" dirty="0" err="1" smtClean="0"/>
+              <a:t>resourceType</a:t>
+            </a:r>
+            <a:endParaRPr lang="en-US" u="sng" dirty="0"/>
           </a:p>
         </p:txBody>
       </p:sp>
@@ -3713,8 +3711,8 @@
         </p:nvSpPr>
         <p:spPr>
           <a:xfrm>
-            <a:off x="3840374" y="706309"/>
-            <a:ext cx="1208536" cy="369332"/>
+            <a:off x="3856416" y="814594"/>
+            <a:ext cx="1192506" cy="369332"/>
           </a:xfrm>
           <a:prstGeom prst="rect">
             <a:avLst/>
@@ -3728,8 +3726,16 @@
           <a:lstStyle/>
           <a:p>
             <a:r>
+              <a:rPr lang="en-US" u="sng" dirty="0"/>
+              <a:t>Has </a:t>
+            </a:r>
+            <a:r>
               <a:rPr lang="en-US" u="sng" dirty="0" smtClean="0"/>
-              <a:t>Has Suffix?</a:t>
+              <a:t>suffix</a:t>
+            </a:r>
+            <a:r>
+              <a:rPr lang="en-US" u="sng" dirty="0"/>
+              <a:t>?</a:t>
             </a:r>
             <a:endParaRPr lang="en-US" u="sng" dirty="0"/>
           </a:p>
@@ -3743,8 +3749,8 @@
         </p:nvSpPr>
         <p:spPr>
           <a:xfrm>
-            <a:off x="6297824" y="706309"/>
-            <a:ext cx="1925399" cy="369332"/>
+            <a:off x="6313867" y="814594"/>
+            <a:ext cx="1838901" cy="369332"/>
           </a:xfrm>
           <a:prstGeom prst="rect">
             <a:avLst/>
@@ -3759,7 +3765,15 @@
           <a:p>
             <a:r>
               <a:rPr lang="en-US" u="sng" dirty="0" smtClean="0"/>
-              <a:t>Has Web Address?</a:t>
+              <a:t>Has </a:t>
+            </a:r>
+            <a:r>
+              <a:rPr lang="en-US" u="sng" dirty="0" err="1" smtClean="0"/>
+              <a:t>webAddress</a:t>
+            </a:r>
+            <a:r>
+              <a:rPr lang="en-US" u="sng" dirty="0"/>
+              <a:t>?</a:t>
             </a:r>
             <a:endParaRPr lang="en-US" u="sng" dirty="0"/>
           </a:p>
@@ -3773,7 +3787,7 @@
         </p:nvSpPr>
         <p:spPr>
           <a:xfrm>
-            <a:off x="9472137" y="706309"/>
+            <a:off x="9488180" y="814594"/>
             <a:ext cx="788999" cy="369332"/>
           </a:xfrm>
           <a:prstGeom prst="rect">
@@ -3788,7 +3802,7 @@
           <a:lstStyle/>
           <a:p>
             <a:r>
-              <a:rPr lang="en-US" u="sng" dirty="0" smtClean="0"/>
+              <a:rPr lang="en-US" u="sng" dirty="0"/>
               <a:t>Action</a:t>
             </a:r>
             <a:endParaRPr lang="en-US" u="sng" dirty="0"/>
@@ -3803,7 +3817,7 @@
         </p:nvSpPr>
         <p:spPr>
           <a:xfrm>
-            <a:off x="4246927" y="4477830"/>
+            <a:off x="4262969" y="4586115"/>
             <a:ext cx="455574" cy="369332"/>
           </a:xfrm>
           <a:prstGeom prst="rect">
@@ -3818,7 +3832,7 @@
           <a:lstStyle/>
           <a:p>
             <a:r>
-              <a:rPr lang="en-US" dirty="0" smtClean="0"/>
+              <a:rPr lang="en-US" dirty="0"/>
               <a:t>No</a:t>
             </a:r>
             <a:endParaRPr lang="en-US" dirty="0"/>
@@ -3833,7 +3847,7 @@
         </p:nvSpPr>
         <p:spPr>
           <a:xfrm>
-            <a:off x="4246927" y="3384598"/>
+            <a:off x="4262969" y="3492883"/>
             <a:ext cx="485646" cy="369332"/>
           </a:xfrm>
           <a:prstGeom prst="rect">
@@ -3848,7 +3862,7 @@
           <a:lstStyle/>
           <a:p>
             <a:r>
-              <a:rPr lang="en-US" dirty="0" smtClean="0"/>
+              <a:rPr lang="en-US" dirty="0"/>
               <a:t>Yes</a:t>
             </a:r>
             <a:endParaRPr lang="en-US" dirty="0"/>
@@ -3863,7 +3877,7 @@
         </p:nvSpPr>
         <p:spPr>
           <a:xfrm>
-            <a:off x="7055305" y="1798082"/>
+            <a:off x="7071347" y="1906367"/>
             <a:ext cx="455574" cy="369332"/>
           </a:xfrm>
           <a:prstGeom prst="rect">
@@ -3878,7 +3892,7 @@
           <a:lstStyle/>
           <a:p>
             <a:r>
-              <a:rPr lang="en-US" dirty="0" smtClean="0"/>
+              <a:rPr lang="en-US" dirty="0"/>
               <a:t>No</a:t>
             </a:r>
             <a:endParaRPr lang="en-US" dirty="0"/>
@@ -3893,7 +3907,7 @@
         </p:nvSpPr>
         <p:spPr>
           <a:xfrm>
-            <a:off x="7055305" y="1257300"/>
+            <a:off x="7071347" y="1365585"/>
             <a:ext cx="485646" cy="369332"/>
           </a:xfrm>
           <a:prstGeom prst="rect">
@@ -3908,7 +3922,7 @@
           <a:lstStyle/>
           <a:p>
             <a:r>
-              <a:rPr lang="en-US" dirty="0" smtClean="0"/>
+              <a:rPr lang="en-US" dirty="0"/>
               <a:t>Yes</a:t>
             </a:r>
             <a:endParaRPr lang="en-US" dirty="0"/>
@@ -3923,7 +3937,7 @@
         </p:nvSpPr>
         <p:spPr>
           <a:xfrm>
-            <a:off x="7085377" y="2849829"/>
+            <a:off x="7101419" y="2958114"/>
             <a:ext cx="455574" cy="369332"/>
           </a:xfrm>
           <a:prstGeom prst="rect">
@@ -3938,7 +3952,7 @@
           <a:lstStyle/>
           <a:p>
             <a:r>
-              <a:rPr lang="en-US" dirty="0" smtClean="0"/>
+              <a:rPr lang="en-US" dirty="0"/>
               <a:t>No</a:t>
             </a:r>
             <a:endParaRPr lang="en-US" dirty="0"/>
@@ -3953,7 +3967,7 @@
         </p:nvSpPr>
         <p:spPr>
           <a:xfrm>
-            <a:off x="7085377" y="2309047"/>
+            <a:off x="7101419" y="2417332"/>
             <a:ext cx="485646" cy="369332"/>
           </a:xfrm>
           <a:prstGeom prst="rect">
@@ -3968,7 +3982,7 @@
           <a:lstStyle/>
           <a:p>
             <a:r>
-              <a:rPr lang="en-US" dirty="0" smtClean="0"/>
+              <a:rPr lang="en-US" dirty="0"/>
               <a:t>Yes</a:t>
             </a:r>
             <a:endParaRPr lang="en-US" dirty="0"/>
@@ -3983,7 +3997,7 @@
         </p:nvSpPr>
         <p:spPr>
           <a:xfrm>
-            <a:off x="7085377" y="3925380"/>
+            <a:off x="7101419" y="4033665"/>
             <a:ext cx="455574" cy="369332"/>
           </a:xfrm>
           <a:prstGeom prst="rect">
@@ -3998,7 +4012,7 @@
           <a:lstStyle/>
           <a:p>
             <a:r>
-              <a:rPr lang="en-US" dirty="0" smtClean="0"/>
+              <a:rPr lang="en-US" dirty="0"/>
               <a:t>No</a:t>
             </a:r>
             <a:endParaRPr lang="en-US" dirty="0"/>
@@ -4013,7 +4027,7 @@
         </p:nvSpPr>
         <p:spPr>
           <a:xfrm>
-            <a:off x="7085377" y="3384598"/>
+            <a:off x="7101419" y="3492883"/>
             <a:ext cx="485646" cy="369332"/>
           </a:xfrm>
           <a:prstGeom prst="rect">
@@ -4028,7 +4042,7 @@
           <a:lstStyle/>
           <a:p>
             <a:r>
-              <a:rPr lang="en-US" dirty="0" smtClean="0"/>
+              <a:rPr lang="en-US" dirty="0"/>
               <a:t>Yes</a:t>
             </a:r>
             <a:endParaRPr lang="en-US" dirty="0"/>
@@ -4045,7 +4059,7 @@
         </p:nvCxnSpPr>
         <p:spPr>
           <a:xfrm flipV="1">
-            <a:off x="2546495" y="1441966"/>
+            <a:off x="2562537" y="1550251"/>
             <a:ext cx="4508810" cy="21066"/>
           </a:xfrm>
           <a:prstGeom prst="straightConnector1">
@@ -4083,7 +4097,7 @@
         </p:nvCxnSpPr>
         <p:spPr>
           <a:xfrm>
-            <a:off x="5619750" y="1448574"/>
+            <a:off x="5635793" y="1556859"/>
             <a:ext cx="1435555" cy="534174"/>
           </a:xfrm>
           <a:prstGeom prst="curvedConnector3">
@@ -4121,7 +4135,7 @@
         </p:nvCxnSpPr>
         <p:spPr>
           <a:xfrm flipV="1">
-            <a:off x="2576568" y="2485863"/>
+            <a:off x="2592611" y="2594149"/>
             <a:ext cx="4508809" cy="42133"/>
           </a:xfrm>
           <a:prstGeom prst="straightConnector1">
@@ -4157,7 +4171,7 @@
         </p:nvCxnSpPr>
         <p:spPr>
           <a:xfrm>
-            <a:off x="5649822" y="2506929"/>
+            <a:off x="5665865" y="2615214"/>
             <a:ext cx="1435555" cy="519716"/>
           </a:xfrm>
           <a:prstGeom prst="curvedConnector3">
@@ -4197,7 +4211,7 @@
         </p:nvCxnSpPr>
         <p:spPr>
           <a:xfrm>
-            <a:off x="4732573" y="3569264"/>
+            <a:off x="4748615" y="3677549"/>
             <a:ext cx="2352804" cy="648"/>
           </a:xfrm>
           <a:prstGeom prst="straightConnector1">
@@ -4233,7 +4247,7 @@
         </p:nvCxnSpPr>
         <p:spPr>
           <a:xfrm>
-            <a:off x="5649822" y="3568941"/>
+            <a:off x="5665865" y="3677226"/>
             <a:ext cx="1435555" cy="541752"/>
           </a:xfrm>
           <a:prstGeom prst="curvedConnector3">
@@ -4273,7 +4287,7 @@
         </p:nvCxnSpPr>
         <p:spPr>
           <a:xfrm>
-            <a:off x="2576567" y="3548488"/>
+            <a:off x="2592609" y="3656773"/>
             <a:ext cx="1670360" cy="20776"/>
           </a:xfrm>
           <a:prstGeom prst="straightConnector1">
@@ -4311,7 +4325,7 @@
         </p:nvCxnSpPr>
         <p:spPr>
           <a:xfrm rot="16200000" flipH="1">
-            <a:off x="3241444" y="3657012"/>
+            <a:off x="3257487" y="3765298"/>
             <a:ext cx="1093717" cy="917249"/>
           </a:xfrm>
           <a:prstGeom prst="curvedConnector2">
@@ -4347,7 +4361,7 @@
         </p:nvCxnSpPr>
         <p:spPr>
           <a:xfrm flipV="1">
-            <a:off x="4702501" y="4661037"/>
+            <a:off x="4718543" y="4769322"/>
             <a:ext cx="4668516" cy="7114"/>
           </a:xfrm>
           <a:prstGeom prst="straightConnector1">
@@ -4383,7 +4397,7 @@
         </p:nvSpPr>
         <p:spPr>
           <a:xfrm>
-            <a:off x="9502209" y="4477829"/>
+            <a:off x="9518252" y="4586114"/>
             <a:ext cx="1819665" cy="369332"/>
           </a:xfrm>
           <a:prstGeom prst="rect">
@@ -4398,7 +4412,7 @@
           <a:lstStyle/>
           <a:p>
             <a:r>
-              <a:rPr lang="en-US" dirty="0" smtClean="0"/>
+              <a:rPr lang="en-US" dirty="0"/>
               <a:t>Display Metadata</a:t>
             </a:r>
             <a:endParaRPr lang="en-US" dirty="0"/>
@@ -4413,7 +4427,7 @@
         </p:nvSpPr>
         <p:spPr>
           <a:xfrm>
-            <a:off x="9502209" y="3925380"/>
+            <a:off x="9518252" y="4033665"/>
             <a:ext cx="1819665" cy="369332"/>
           </a:xfrm>
           <a:prstGeom prst="rect">
@@ -4428,7 +4442,7 @@
           <a:lstStyle/>
           <a:p>
             <a:r>
-              <a:rPr lang="en-US" dirty="0" smtClean="0"/>
+              <a:rPr lang="en-US" dirty="0"/>
               <a:t>Display Metadata</a:t>
             </a:r>
             <a:endParaRPr lang="en-US" dirty="0"/>
@@ -4443,7 +4457,7 @@
         </p:nvSpPr>
         <p:spPr>
           <a:xfrm>
-            <a:off x="9472137" y="1798082"/>
+            <a:off x="9488180" y="1906367"/>
             <a:ext cx="1819665" cy="369332"/>
           </a:xfrm>
           <a:prstGeom prst="rect">
@@ -4458,7 +4472,7 @@
           <a:lstStyle/>
           <a:p>
             <a:r>
-              <a:rPr lang="en-US" dirty="0" smtClean="0"/>
+              <a:rPr lang="en-US" dirty="0"/>
               <a:t>Display Metadata</a:t>
             </a:r>
             <a:endParaRPr lang="en-US" dirty="0"/>
@@ -4473,7 +4487,7 @@
         </p:nvSpPr>
         <p:spPr>
           <a:xfrm>
-            <a:off x="9472137" y="1278366"/>
+            <a:off x="9488180" y="1386651"/>
             <a:ext cx="962699" cy="369332"/>
           </a:xfrm>
           <a:prstGeom prst="rect">
@@ -4488,7 +4502,7 @@
           <a:lstStyle/>
           <a:p>
             <a:r>
-              <a:rPr lang="en-US" smtClean="0"/>
+              <a:rPr lang="en-US"/>
               <a:t>Forward</a:t>
             </a:r>
             <a:endParaRPr lang="en-US"/>
@@ -4503,8 +4517,8 @@
         </p:nvSpPr>
         <p:spPr>
           <a:xfrm>
-            <a:off x="9502209" y="3386613"/>
-            <a:ext cx="1847109" cy="369332"/>
+            <a:off x="9518252" y="3494898"/>
+            <a:ext cx="1831079" cy="369332"/>
           </a:xfrm>
           <a:prstGeom prst="rect">
             <a:avLst/>
@@ -4518,8 +4532,16 @@
           <a:lstStyle/>
           <a:p>
             <a:r>
+              <a:rPr lang="en-US" dirty="0"/>
+              <a:t>Forward + </a:t>
+            </a:r>
+            <a:r>
               <a:rPr lang="en-US" dirty="0" smtClean="0"/>
-              <a:t>Forward + {Suffix}</a:t>
+              <a:t>{suffix</a:t>
+            </a:r>
+            <a:r>
+              <a:rPr lang="en-US" dirty="0"/>
+              <a:t>}</a:t>
             </a:r>
             <a:endParaRPr lang="en-US" dirty="0"/>
           </a:p>
@@ -4533,7 +4555,7 @@
         </p:nvSpPr>
         <p:spPr>
           <a:xfrm>
-            <a:off x="9502209" y="2849829"/>
+            <a:off x="9518252" y="2958114"/>
             <a:ext cx="1819665" cy="369332"/>
           </a:xfrm>
           <a:prstGeom prst="rect">
@@ -4548,7 +4570,7 @@
           <a:lstStyle/>
           <a:p>
             <a:r>
-              <a:rPr lang="en-US" dirty="0" smtClean="0"/>
+              <a:rPr lang="en-US" dirty="0"/>
               <a:t>Display Metadata</a:t>
             </a:r>
             <a:endParaRPr lang="en-US" dirty="0"/>
@@ -4563,7 +4585,7 @@
         </p:nvSpPr>
         <p:spPr>
           <a:xfrm>
-            <a:off x="9502209" y="2301197"/>
+            <a:off x="9518252" y="2409482"/>
             <a:ext cx="962699" cy="369332"/>
           </a:xfrm>
           <a:prstGeom prst="rect">
@@ -4578,7 +4600,7 @@
           <a:lstStyle/>
           <a:p>
             <a:r>
-              <a:rPr lang="en-US" smtClean="0"/>
+              <a:rPr lang="en-US"/>
               <a:t>Forward</a:t>
             </a:r>
             <a:endParaRPr lang="en-US"/>
@@ -4595,7 +4617,7 @@
         </p:nvCxnSpPr>
         <p:spPr>
           <a:xfrm>
-            <a:off x="7540951" y="4110046"/>
+            <a:off x="7556993" y="4218331"/>
             <a:ext cx="1830066" cy="0"/>
           </a:xfrm>
           <a:prstGeom prst="straightConnector1">
@@ -4631,7 +4653,7 @@
         </p:nvCxnSpPr>
         <p:spPr>
           <a:xfrm>
-            <a:off x="7540951" y="3570325"/>
+            <a:off x="7556993" y="3678610"/>
             <a:ext cx="1830066" cy="0"/>
           </a:xfrm>
           <a:prstGeom prst="straightConnector1">
@@ -4667,7 +4689,7 @@
         </p:nvCxnSpPr>
         <p:spPr>
           <a:xfrm>
-            <a:off x="7571023" y="3026645"/>
+            <a:off x="7587065" y="3134930"/>
             <a:ext cx="1830066" cy="0"/>
           </a:xfrm>
           <a:prstGeom prst="straightConnector1">
@@ -4703,7 +4725,7 @@
         </p:nvCxnSpPr>
         <p:spPr>
           <a:xfrm>
-            <a:off x="7571023" y="2486924"/>
+            <a:off x="7587065" y="2595209"/>
             <a:ext cx="1830066" cy="0"/>
           </a:xfrm>
           <a:prstGeom prst="straightConnector1">
@@ -4739,7 +4761,7 @@
         </p:nvCxnSpPr>
         <p:spPr>
           <a:xfrm>
-            <a:off x="7540951" y="1984296"/>
+            <a:off x="7556993" y="2092581"/>
             <a:ext cx="1830066" cy="0"/>
           </a:xfrm>
           <a:prstGeom prst="straightConnector1">
@@ -4775,7 +4797,7 @@
         </p:nvCxnSpPr>
         <p:spPr>
           <a:xfrm>
-            <a:off x="7540951" y="1444575"/>
+            <a:off x="7556993" y="1552860"/>
             <a:ext cx="1830066" cy="0"/>
           </a:xfrm>
           <a:prstGeom prst="straightConnector1">
@@ -4811,8 +4833,8 @@
         </p:nvSpPr>
         <p:spPr>
           <a:xfrm>
-            <a:off x="426812" y="4841276"/>
-            <a:ext cx="8969635" cy="2031325"/>
+            <a:off x="442855" y="4949562"/>
+            <a:ext cx="10892854" cy="3139321"/>
           </a:xfrm>
           <a:prstGeom prst="rect">
             <a:avLst/>
@@ -4826,14 +4848,109 @@
           <a:lstStyle/>
           <a:p>
             <a:r>
-              <a:rPr lang="en-US" u="sng" dirty="0" smtClean="0"/>
-              <a:t>Forward Logic:</a:t>
-            </a:r>
-          </a:p>
-          <a:p>
-            <a:r>
               <a:rPr lang="en-US" dirty="0" smtClean="0"/>
-              <a:t>If </a:t>
+              <a:t>/* Forwarding Logic */  --- SO, JUST DO THIS FOR {ARK} and can ADD THIS TO WEBADDRESS URL </a:t>
+            </a:r>
+            <a:r>
+              <a:rPr lang="en-US" dirty="0" err="1" smtClean="0"/>
+              <a:t>oR</a:t>
+            </a:r>
+            <a:r>
+              <a:rPr lang="en-US" smtClean="0"/>
+              <a:t> IN CONFIG FILE</a:t>
+            </a:r>
+            <a:endParaRPr lang="en-US" dirty="0" smtClean="0"/>
+          </a:p>
+          <a:p>
+            <a:r>
+              <a:rPr lang="en-US" dirty="0"/>
+              <a:t>r</a:t>
+            </a:r>
+            <a:r>
+              <a:rPr lang="en-US" dirty="0" smtClean="0"/>
+              <a:t>eturn </a:t>
+            </a:r>
+            <a:r>
+              <a:rPr lang="en-US" dirty="0" err="1" smtClean="0"/>
+              <a:t>webAddress</a:t>
+            </a:r>
+            <a:r>
+              <a:rPr lang="en-US" dirty="0" smtClean="0"/>
+              <a:t>/${ark}/${suffix}</a:t>
+            </a:r>
+            <a:endParaRPr lang="en-US" dirty="0"/>
+          </a:p>
+          <a:p>
+            <a:r>
+              <a:rPr lang="en-US" dirty="0" smtClean="0"/>
+              <a:t>If (</a:t>
+            </a:r>
+            <a:r>
+              <a:rPr lang="en-US" dirty="0" err="1" smtClean="0"/>
+              <a:t>webAddress</a:t>
+            </a:r>
+            <a:r>
+              <a:rPr lang="en-US" dirty="0" smtClean="0"/>
+              <a:t>) {  </a:t>
+            </a:r>
+          </a:p>
+          <a:p>
+            <a:r>
+              <a:rPr lang="en-US" dirty="0" smtClean="0"/>
+              <a:t>     if (suffix) return </a:t>
+            </a:r>
+            <a:r>
+              <a:rPr lang="en-US" dirty="0" err="1" smtClean="0"/>
+              <a:t>webAddress</a:t>
+            </a:r>
+            <a:r>
+              <a:rPr lang="en-US" dirty="0" smtClean="0"/>
+              <a:t>{suffix}</a:t>
+            </a:r>
+          </a:p>
+          <a:p>
+            <a:r>
+              <a:rPr lang="en-US" dirty="0" smtClean="0"/>
+              <a:t>     else return </a:t>
+            </a:r>
+            <a:r>
+              <a:rPr lang="en-US" dirty="0" err="1" smtClean="0"/>
+              <a:t>webAddress</a:t>
+            </a:r>
+            <a:r>
+              <a:rPr lang="en-US" dirty="0"/>
+              <a:t>; </a:t>
+            </a:r>
+            <a:endParaRPr lang="en-US" dirty="0" smtClean="0"/>
+          </a:p>
+          <a:p>
+            <a:r>
+              <a:rPr lang="en-US" dirty="0" smtClean="0"/>
+              <a:t>// No </a:t>
+            </a:r>
+            <a:r>
+              <a:rPr lang="en-US" dirty="0" err="1" smtClean="0"/>
+              <a:t>webAddress</a:t>
+            </a:r>
+            <a:r>
+              <a:rPr lang="en-US" dirty="0" smtClean="0"/>
+              <a:t> specified in database</a:t>
+            </a:r>
+          </a:p>
+          <a:p>
+            <a:r>
+              <a:rPr lang="en-US" dirty="0" smtClean="0"/>
+              <a:t>else </a:t>
+            </a:r>
+            <a:r>
+              <a:rPr lang="en-US" dirty="0"/>
+              <a:t>{</a:t>
+            </a:r>
+          </a:p>
+          <a:p>
+            <a:r>
+              <a:rPr lang="en-US" dirty="0"/>
+              <a:t>     If </a:t>
             </a:r>
             <a:r>
               <a:rPr lang="en-US" dirty="0" smtClean="0"/>
@@ -4841,40 +4958,49 @@
             </a:r>
             <a:r>
               <a:rPr lang="en-US" dirty="0" err="1" smtClean="0"/>
-              <a:t>bcid.webaddress</a:t>
+              <a:t>resourceType</a:t>
             </a:r>
             <a:r>
               <a:rPr lang="en-US" dirty="0" smtClean="0"/>
-              <a:t> != null) return </a:t>
-            </a:r>
-            <a:r>
-              <a:rPr lang="en-US" dirty="0" err="1" smtClean="0"/>
-              <a:t>bcid.webaddress</a:t>
-            </a:r>
-            <a:r>
-              <a:rPr lang="en-US" dirty="0" smtClean="0"/>
-              <a:t>;   // From database</a:t>
-            </a:r>
-            <a:endParaRPr lang="en-US" dirty="0" smtClean="0"/>
-          </a:p>
-          <a:p>
-            <a:r>
-              <a:rPr lang="en-US" dirty="0" smtClean="0"/>
-              <a:t>else {</a:t>
-            </a:r>
-          </a:p>
-          <a:p>
-            <a:r>
-              <a:rPr lang="en-US" dirty="0" smtClean="0"/>
-              <a:t>     If </a:t>
+              <a:t> == </a:t>
+            </a:r>
+            <a:r>
+              <a:rPr lang="en-US" dirty="0"/>
+              <a:t>Expedition) return &lt;</a:t>
+            </a:r>
+            <a:r>
+              <a:rPr lang="en-US" dirty="0" err="1"/>
+              <a:t>metadataParam.expeditionForwardingAddress</a:t>
+            </a:r>
+            <a:r>
+              <a:rPr lang="en-US" dirty="0"/>
+              <a:t>&gt;{ark};</a:t>
+            </a:r>
+          </a:p>
+          <a:p>
+            <a:r>
+              <a:rPr lang="en-US" dirty="0"/>
+              <a:t> </a:t>
+            </a:r>
+            <a:r>
+              <a:rPr lang="en-US" dirty="0"/>
+              <a:t>    else if </a:t>
             </a:r>
             <a:r>
               <a:rPr lang="en-US" dirty="0" smtClean="0"/>
               <a:t>(</a:t>
             </a:r>
             <a:r>
+              <a:rPr lang="en-US" dirty="0" err="1" smtClean="0"/>
+              <a:t>resourceType</a:t>
+            </a:r>
+            <a:r>
               <a:rPr lang="en-US" dirty="0" smtClean="0"/>
-              <a:t>ID Type = Expedition) return </a:t>
+              <a:t> </a:t>
+            </a:r>
+            <a:r>
+              <a:rPr lang="en-US" dirty="0"/>
+              <a:t>!= Dataset) return </a:t>
             </a:r>
             <a:r>
               <a:rPr lang="en-US" dirty="0" smtClean="0"/>
@@ -4882,13 +5008,16 @@
             </a:r>
             <a:r>
               <a:rPr lang="en-US" dirty="0" err="1" smtClean="0"/>
-              <a:t>metadataParam.expeditionForwardingAddress</a:t>
+              <a:t>metadataParam.conceptForwardingAddress</a:t>
             </a:r>
             <a:r>
               <a:rPr lang="en-US" dirty="0" smtClean="0"/>
-              <a:t>&gt;{ark};</a:t>
-            </a:r>
-            <a:endParaRPr lang="en-US" dirty="0" smtClean="0"/>
+              <a:t>&gt;/{</a:t>
+            </a:r>
+            <a:r>
+              <a:rPr lang="en-US" dirty="0"/>
+              <a:t>ark}/{suffix};</a:t>
+            </a:r>
           </a:p>
           <a:p>
             <a:r>
@@ -4896,44 +5025,16 @@
               <a:t> </a:t>
             </a:r>
             <a:r>
-              <a:rPr lang="en-US" dirty="0" smtClean="0"/>
-              <a:t>    else if (ID Type != Dataset) return </a:t>
-            </a:r>
-            <a:r>
-              <a:rPr lang="en-US" dirty="0" err="1" smtClean="0"/>
-              <a:t>metadataParam.conceptForwardingAddress</a:t>
-            </a:r>
-            <a:r>
-              <a:rPr lang="en-US" dirty="0" smtClean="0"/>
-              <a:t>/{ark}/{suffix};</a:t>
-            </a:r>
-            <a:endParaRPr lang="en-US" dirty="0" smtClean="0"/>
-          </a:p>
-          <a:p>
-            <a:r>
               <a:rPr lang="en-US" dirty="0"/>
-              <a:t> </a:t>
-            </a:r>
-            <a:r>
-              <a:rPr lang="en-US" dirty="0" smtClean="0"/>
-              <a:t>    else return “Display Metadata </a:t>
-            </a:r>
-            <a:r>
-              <a:rPr lang="en-US" smtClean="0"/>
-              <a:t>Address</a:t>
-            </a:r>
-            <a:r>
-              <a:rPr lang="en-US" smtClean="0"/>
-              <a:t>”                    </a:t>
-            </a:r>
-            <a:endParaRPr lang="en-US" dirty="0" smtClean="0"/>
+              <a:t>    else return “Display Metadata Address”                    </a:t>
+            </a:r>
           </a:p>
           <a:p>
             <a:r>
               <a:rPr lang="en-US" dirty="0"/>
               <a:t>}</a:t>
             </a:r>
-            <a:endParaRPr lang="en-US" dirty="0" smtClean="0"/>
+            <a:endParaRPr lang="en-US" dirty="0"/>
           </a:p>
         </p:txBody>
       </p:sp>
@@ -4945,7 +5046,7 @@
         </p:nvSpPr>
         <p:spPr>
           <a:xfrm>
-            <a:off x="9684310" y="5657850"/>
+            <a:off x="9700352" y="5766136"/>
             <a:ext cx="1395318" cy="646331"/>
           </a:xfrm>
           <a:prstGeom prst="rect">
@@ -4960,13 +5061,13 @@
           <a:lstStyle/>
           <a:p>
             <a:r>
-              <a:rPr lang="en-US" i="1" dirty="0" smtClean="0"/>
+              <a:rPr lang="en-US" i="1" dirty="0"/>
               <a:t>Uses apache</a:t>
             </a:r>
           </a:p>
           <a:p>
             <a:r>
-              <a:rPr lang="en-US" i="1" dirty="0" err="1" smtClean="0"/>
+              <a:rPr lang="en-US" i="1" dirty="0" err="1"/>
               <a:t>strSubstituor</a:t>
             </a:r>
             <a:endParaRPr lang="en-US" i="1" dirty="0"/>
@@ -4981,7 +5082,7 @@
         </p:nvSpPr>
         <p:spPr>
           <a:xfrm>
-            <a:off x="9502209" y="5738129"/>
+            <a:off x="9518251" y="5846414"/>
             <a:ext cx="130702" cy="566052"/>
           </a:xfrm>
           <a:prstGeom prst="rightBrace">
@@ -5032,7 +5133,7 @@
 <file path=ppt/theme/theme1.xml><?xml version="1.0" encoding="utf-8"?>
 <a:theme xmlns:a="http://schemas.openxmlformats.org/drawingml/2006/main" name="Office Theme">
   <a:themeElements>
-    <a:clrScheme name="Office">
+    <a:clrScheme name="Office Theme">
       <a:dk1>
         <a:sysClr val="windowText" lastClr="000000"/>
       </a:dk1>
@@ -5070,14 +5171,14 @@
         <a:srgbClr val="954F72"/>
       </a:folHlink>
     </a:clrScheme>
-    <a:fontScheme name="Office">
+    <a:fontScheme name="Office Theme">
       <a:majorFont>
         <a:latin typeface="Calibri Light" panose="020F0302020204030204"/>
         <a:ea typeface=""/>
         <a:cs typeface=""/>
-        <a:font script="Jpan" typeface="Yu Gothic Light"/>
+        <a:font script="Jpan" typeface="ＭＳ Ｐゴシック"/>
         <a:font script="Hang" typeface="맑은 고딕"/>
-        <a:font script="Hans" typeface="DengXian Light"/>
+        <a:font script="Hans" typeface="宋体"/>
         <a:font script="Hant" typeface="新細明體"/>
         <a:font script="Arab" typeface="Times New Roman"/>
         <a:font script="Hebr" typeface="Times New Roman"/>
@@ -5110,9 +5211,9 @@
         <a:latin typeface="Calibri" panose="020F0502020204030204"/>
         <a:ea typeface=""/>
         <a:cs typeface=""/>
-        <a:font script="Jpan" typeface="Yu Gothic"/>
+        <a:font script="Jpan" typeface="ＭＳ Ｐゴシック"/>
         <a:font script="Hang" typeface="맑은 고딕"/>
-        <a:font script="Hans" typeface="DengXian"/>
+        <a:font script="Hans" typeface="宋体"/>
         <a:font script="Hant" typeface="新細明體"/>
         <a:font script="Arab" typeface="Arial"/>
         <a:font script="Hebr" typeface="Arial"/>
@@ -5142,7 +5243,7 @@
         <a:font script="Geor" typeface="Sylfaen"/>
       </a:minorFont>
     </a:fontScheme>
-    <a:fmtScheme name="Office">
+    <a:fmtScheme name="Office Theme">
       <a:fillStyleLst>
         <a:solidFill>
           <a:schemeClr val="phClr"/>

</xml_diff>